<commit_message>
update pptx in main
</commit_message>
<xml_diff>
--- a/Function calling.pptx
+++ b/Function calling.pptx
@@ -9,11 +9,15 @@
     <p:sldId id="257" r:id="rId3"/>
     <p:sldId id="258" r:id="rId4"/>
     <p:sldId id="263" r:id="rId5"/>
-    <p:sldId id="259" r:id="rId6"/>
-    <p:sldId id="261" r:id="rId7"/>
-    <p:sldId id="260" r:id="rId8"/>
-    <p:sldId id="264" r:id="rId9"/>
-    <p:sldId id="262" r:id="rId10"/>
+    <p:sldId id="265" r:id="rId6"/>
+    <p:sldId id="259" r:id="rId7"/>
+    <p:sldId id="261" r:id="rId8"/>
+    <p:sldId id="260" r:id="rId9"/>
+    <p:sldId id="264" r:id="rId10"/>
+    <p:sldId id="266" r:id="rId11"/>
+    <p:sldId id="267" r:id="rId12"/>
+    <p:sldId id="268" r:id="rId13"/>
+    <p:sldId id="262" r:id="rId14"/>
   </p:sldIdLst>
   <p:sldSz cx="12192000" cy="6858000"/>
   <p:notesSz cx="6858000" cy="9144000"/>
@@ -267,7 +271,7 @@
           <a:p>
             <a:fld id="{BAD0B23A-5A61-4A5C-AD01-6CDF493C7C46}" type="datetimeFigureOut">
               <a:rPr lang="en-US" smtClean="0"/>
-              <a:t>11/30/2023</a:t>
+              <a:t>1/8/2024</a:t>
             </a:fld>
             <a:endParaRPr lang="en-US"/>
           </a:p>
@@ -465,7 +469,7 @@
           <a:p>
             <a:fld id="{BAD0B23A-5A61-4A5C-AD01-6CDF493C7C46}" type="datetimeFigureOut">
               <a:rPr lang="en-US" smtClean="0"/>
-              <a:t>11/30/2023</a:t>
+              <a:t>1/8/2024</a:t>
             </a:fld>
             <a:endParaRPr lang="en-US"/>
           </a:p>
@@ -673,7 +677,7 @@
           <a:p>
             <a:fld id="{BAD0B23A-5A61-4A5C-AD01-6CDF493C7C46}" type="datetimeFigureOut">
               <a:rPr lang="en-US" smtClean="0"/>
-              <a:t>11/30/2023</a:t>
+              <a:t>1/8/2024</a:t>
             </a:fld>
             <a:endParaRPr lang="en-US"/>
           </a:p>
@@ -871,7 +875,7 @@
           <a:p>
             <a:fld id="{BAD0B23A-5A61-4A5C-AD01-6CDF493C7C46}" type="datetimeFigureOut">
               <a:rPr lang="en-US" smtClean="0"/>
-              <a:t>11/30/2023</a:t>
+              <a:t>1/8/2024</a:t>
             </a:fld>
             <a:endParaRPr lang="en-US"/>
           </a:p>
@@ -1146,7 +1150,7 @@
           <a:p>
             <a:fld id="{BAD0B23A-5A61-4A5C-AD01-6CDF493C7C46}" type="datetimeFigureOut">
               <a:rPr lang="en-US" smtClean="0"/>
-              <a:t>11/30/2023</a:t>
+              <a:t>1/8/2024</a:t>
             </a:fld>
             <a:endParaRPr lang="en-US"/>
           </a:p>
@@ -1411,7 +1415,7 @@
           <a:p>
             <a:fld id="{BAD0B23A-5A61-4A5C-AD01-6CDF493C7C46}" type="datetimeFigureOut">
               <a:rPr lang="en-US" smtClean="0"/>
-              <a:t>11/30/2023</a:t>
+              <a:t>1/8/2024</a:t>
             </a:fld>
             <a:endParaRPr lang="en-US"/>
           </a:p>
@@ -1823,7 +1827,7 @@
           <a:p>
             <a:fld id="{BAD0B23A-5A61-4A5C-AD01-6CDF493C7C46}" type="datetimeFigureOut">
               <a:rPr lang="en-US" smtClean="0"/>
-              <a:t>11/30/2023</a:t>
+              <a:t>1/8/2024</a:t>
             </a:fld>
             <a:endParaRPr lang="en-US"/>
           </a:p>
@@ -1964,7 +1968,7 @@
           <a:p>
             <a:fld id="{BAD0B23A-5A61-4A5C-AD01-6CDF493C7C46}" type="datetimeFigureOut">
               <a:rPr lang="en-US" smtClean="0"/>
-              <a:t>11/30/2023</a:t>
+              <a:t>1/8/2024</a:t>
             </a:fld>
             <a:endParaRPr lang="en-US"/>
           </a:p>
@@ -2077,7 +2081,7 @@
           <a:p>
             <a:fld id="{BAD0B23A-5A61-4A5C-AD01-6CDF493C7C46}" type="datetimeFigureOut">
               <a:rPr lang="en-US" smtClean="0"/>
-              <a:t>11/30/2023</a:t>
+              <a:t>1/8/2024</a:t>
             </a:fld>
             <a:endParaRPr lang="en-US"/>
           </a:p>
@@ -2388,7 +2392,7 @@
           <a:p>
             <a:fld id="{BAD0B23A-5A61-4A5C-AD01-6CDF493C7C46}" type="datetimeFigureOut">
               <a:rPr lang="en-US" smtClean="0"/>
-              <a:t>11/30/2023</a:t>
+              <a:t>1/8/2024</a:t>
             </a:fld>
             <a:endParaRPr lang="en-US"/>
           </a:p>
@@ -2676,7 +2680,7 @@
           <a:p>
             <a:fld id="{BAD0B23A-5A61-4A5C-AD01-6CDF493C7C46}" type="datetimeFigureOut">
               <a:rPr lang="en-US" smtClean="0"/>
-              <a:t>11/30/2023</a:t>
+              <a:t>1/8/2024</a:t>
             </a:fld>
             <a:endParaRPr lang="en-US"/>
           </a:p>
@@ -2917,7 +2921,7 @@
           <a:p>
             <a:fld id="{BAD0B23A-5A61-4A5C-AD01-6CDF493C7C46}" type="datetimeFigureOut">
               <a:rPr lang="en-US" smtClean="0"/>
-              <a:t>11/30/2023</a:t>
+              <a:t>1/8/2024</a:t>
             </a:fld>
             <a:endParaRPr lang="en-US"/>
           </a:p>
@@ -3450,6 +3454,645 @@
 </p:sld>
 </file>
 
+<file path=ppt/slides/slide10.xml><?xml version="1.0" encoding="utf-8"?>
+<p:sld xmlns:a="http://schemas.openxmlformats.org/drawingml/2006/main" xmlns:r="http://schemas.openxmlformats.org/officeDocument/2006/relationships" xmlns:p="http://schemas.openxmlformats.org/presentationml/2006/main">
+  <p:cSld>
+    <p:spTree>
+      <p:nvGrpSpPr>
+        <p:cNvPr id="1" name=""/>
+        <p:cNvGrpSpPr/>
+        <p:nvPr/>
+      </p:nvGrpSpPr>
+      <p:grpSpPr>
+        <a:xfrm>
+          <a:off x="0" y="0"/>
+          <a:ext cx="0" cy="0"/>
+          <a:chOff x="0" y="0"/>
+          <a:chExt cx="0" cy="0"/>
+        </a:xfrm>
+      </p:grpSpPr>
+      <p:sp>
+        <p:nvSpPr>
+          <p:cNvPr id="2" name="Title 1">
+            <a:extLst>
+              <a:ext uri="{FF2B5EF4-FFF2-40B4-BE49-F238E27FC236}">
+                <a16:creationId xmlns:a16="http://schemas.microsoft.com/office/drawing/2014/main" id="{34C99798-D831-0741-2031-6CC6E08DD38F}"/>
+              </a:ext>
+            </a:extLst>
+          </p:cNvPr>
+          <p:cNvSpPr>
+            <a:spLocks noGrp="1"/>
+          </p:cNvSpPr>
+          <p:nvPr>
+            <p:ph type="title"/>
+          </p:nvPr>
+        </p:nvSpPr>
+        <p:spPr/>
+        <p:txBody>
+          <a:bodyPr/>
+          <a:lstStyle/>
+          <a:p>
+            <a:r>
+              <a:rPr lang="en-US" dirty="0"/>
+              <a:t>Tools-calls</a:t>
+            </a:r>
+          </a:p>
+        </p:txBody>
+      </p:sp>
+      <p:sp>
+        <p:nvSpPr>
+          <p:cNvPr id="3" name="Content Placeholder 2">
+            <a:extLst>
+              <a:ext uri="{FF2B5EF4-FFF2-40B4-BE49-F238E27FC236}">
+                <a16:creationId xmlns:a16="http://schemas.microsoft.com/office/drawing/2014/main" id="{68F51F98-4A09-C940-F5F3-B7703CD32365}"/>
+              </a:ext>
+            </a:extLst>
+          </p:cNvPr>
+          <p:cNvSpPr>
+            <a:spLocks noGrp="1"/>
+          </p:cNvSpPr>
+          <p:nvPr>
+            <p:ph idx="1"/>
+          </p:nvPr>
+        </p:nvSpPr>
+        <p:spPr/>
+        <p:txBody>
+          <a:bodyPr/>
+          <a:lstStyle/>
+          <a:p>
+            <a:r>
+              <a:rPr lang="en-US" dirty="0"/>
+              <a:t>gpt-3.5 1106 and gpt-4 1106 have made Function calls "deprecated": they have become a possible </a:t>
+            </a:r>
+            <a:r>
+              <a:rPr lang="en-US" i="1" dirty="0"/>
+              <a:t>tool-type</a:t>
+            </a:r>
+            <a:r>
+              <a:rPr lang="en-US" dirty="0"/>
+              <a:t> value for tools-calls</a:t>
+            </a:r>
+          </a:p>
+          <a:p>
+            <a:r>
+              <a:rPr lang="en-US" dirty="0"/>
+              <a:t>Tools are an abstraction to accommodate different "external data sources" </a:t>
+            </a:r>
+          </a:p>
+          <a:p>
+            <a:pPr lvl="1"/>
+            <a:r>
+              <a:rPr lang="en-US" dirty="0"/>
+              <a:t>Currently "function" is the only tool type supported</a:t>
+            </a:r>
+          </a:p>
+          <a:p>
+            <a:pPr lvl="1"/>
+            <a:r>
+              <a:rPr lang="en-US" dirty="0"/>
+              <a:t>Chatgpt can return reply with more than one tool call</a:t>
+            </a:r>
+          </a:p>
+          <a:p>
+            <a:r>
+              <a:rPr lang="en-US" dirty="0"/>
+              <a:t>Assistant api have similar concept of tools but support more: Functions, Code interpreter, Knowledge Retrieval</a:t>
+            </a:r>
+          </a:p>
+          <a:p>
+            <a:pPr lvl="1"/>
+            <a:r>
+              <a:rPr lang="en-US" dirty="0"/>
+              <a:t>Still in beta, deserve a dedicated session</a:t>
+            </a:r>
+          </a:p>
+          <a:p>
+            <a:pPr lvl="1"/>
+            <a:endParaRPr lang="en-US" dirty="0"/>
+          </a:p>
+        </p:txBody>
+      </p:sp>
+    </p:spTree>
+    <p:extLst>
+      <p:ext uri="{BB962C8B-B14F-4D97-AF65-F5344CB8AC3E}">
+        <p14:creationId xmlns:p14="http://schemas.microsoft.com/office/powerpoint/2010/main" val="1466022549"/>
+      </p:ext>
+    </p:extLst>
+  </p:cSld>
+  <p:clrMapOvr>
+    <a:masterClrMapping/>
+  </p:clrMapOvr>
+</p:sld>
+</file>
+
+<file path=ppt/slides/slide11.xml><?xml version="1.0" encoding="utf-8"?>
+<p:sld xmlns:a="http://schemas.openxmlformats.org/drawingml/2006/main" xmlns:r="http://schemas.openxmlformats.org/officeDocument/2006/relationships" xmlns:p="http://schemas.openxmlformats.org/presentationml/2006/main">
+  <p:cSld>
+    <p:spTree>
+      <p:nvGrpSpPr>
+        <p:cNvPr id="1" name=""/>
+        <p:cNvGrpSpPr/>
+        <p:nvPr/>
+      </p:nvGrpSpPr>
+      <p:grpSpPr>
+        <a:xfrm>
+          <a:off x="0" y="0"/>
+          <a:ext cx="0" cy="0"/>
+          <a:chOff x="0" y="0"/>
+          <a:chExt cx="0" cy="0"/>
+        </a:xfrm>
+      </p:grpSpPr>
+      <p:sp>
+        <p:nvSpPr>
+          <p:cNvPr id="3" name="Content Placeholder 2">
+            <a:extLst>
+              <a:ext uri="{FF2B5EF4-FFF2-40B4-BE49-F238E27FC236}">
+                <a16:creationId xmlns:a16="http://schemas.microsoft.com/office/drawing/2014/main" id="{962A1F63-26DC-0AF6-E788-C9BDEA11A97E}"/>
+              </a:ext>
+            </a:extLst>
+          </p:cNvPr>
+          <p:cNvSpPr>
+            <a:spLocks noGrp="1"/>
+          </p:cNvSpPr>
+          <p:nvPr>
+            <p:ph idx="1"/>
+          </p:nvPr>
+        </p:nvSpPr>
+        <p:spPr>
+          <a:xfrm>
+            <a:off x="536448" y="115696"/>
+            <a:ext cx="11497056" cy="6413119"/>
+          </a:xfrm>
+        </p:spPr>
+        <p:txBody>
+          <a:bodyPr>
+            <a:noAutofit/>
+          </a:bodyPr>
+          <a:lstStyle/>
+          <a:p>
+            <a:pPr marL="0" indent="0">
+              <a:buNone/>
+            </a:pPr>
+            <a:r>
+              <a:rPr lang="en-US" sz="1800" dirty="0"/>
+              <a:t>tools = [     {</a:t>
+            </a:r>
+            <a:br>
+              <a:rPr lang="en-US" sz="1800" dirty="0"/>
+            </a:br>
+            <a:r>
+              <a:rPr lang="en-US" sz="1800" dirty="0"/>
+              <a:t>        "type": "function",</a:t>
+            </a:r>
+            <a:br>
+              <a:rPr lang="en-US" sz="1800" dirty="0"/>
+            </a:br>
+            <a:r>
+              <a:rPr lang="en-US" sz="1800" dirty="0"/>
+              <a:t>        "function": { "name": "</a:t>
+            </a:r>
+            <a:r>
+              <a:rPr lang="en-US" sz="1800" dirty="0" err="1"/>
+              <a:t>get_current_weather</a:t>
+            </a:r>
+            <a:r>
+              <a:rPr lang="en-US" sz="1800" dirty="0"/>
+              <a:t>",             "description": "Get the current weather",</a:t>
+            </a:r>
+            <a:br>
+              <a:rPr lang="en-US" sz="1800" dirty="0"/>
+            </a:br>
+            <a:r>
+              <a:rPr lang="en-US" sz="1800" dirty="0"/>
+              <a:t>            "parameters": {</a:t>
+            </a:r>
+            <a:br>
+              <a:rPr lang="en-US" sz="1800" dirty="0"/>
+            </a:br>
+            <a:r>
+              <a:rPr lang="en-US" sz="1800" dirty="0"/>
+              <a:t>                "type": "object",</a:t>
+            </a:r>
+            <a:br>
+              <a:rPr lang="en-US" sz="1800" dirty="0"/>
+            </a:br>
+            <a:r>
+              <a:rPr lang="en-US" sz="1800" dirty="0"/>
+              <a:t>                "properties": { </a:t>
+            </a:r>
+            <a:br>
+              <a:rPr lang="en-US" sz="1800" dirty="0"/>
+            </a:br>
+            <a:r>
+              <a:rPr lang="en-US" sz="1800" dirty="0"/>
+              <a:t>                    "location": { "type": "string",  "description": "The city and state, e.g. San Francisco, CA" } </a:t>
+            </a:r>
+            <a:br>
+              <a:rPr lang="en-US" sz="1800" dirty="0"/>
+            </a:br>
+            <a:r>
+              <a:rPr lang="en-US" sz="1800" dirty="0"/>
+              <a:t>                },</a:t>
+            </a:r>
+            <a:br>
+              <a:rPr lang="en-US" sz="1800" dirty="0"/>
+            </a:br>
+            <a:r>
+              <a:rPr lang="en-US" sz="1800" dirty="0"/>
+              <a:t>                "required": ["location"]</a:t>
+            </a:r>
+            <a:br>
+              <a:rPr lang="en-US" sz="1800" dirty="0"/>
+            </a:br>
+            <a:r>
+              <a:rPr lang="en-US" sz="1800" dirty="0"/>
+              <a:t>            },</a:t>
+            </a:r>
+            <a:br>
+              <a:rPr lang="en-US" sz="1800" dirty="0"/>
+            </a:br>
+            <a:r>
+              <a:rPr lang="en-US" sz="1800" dirty="0"/>
+              <a:t>        }</a:t>
+            </a:r>
+            <a:br>
+              <a:rPr lang="en-US" sz="1800" dirty="0"/>
+            </a:br>
+            <a:r>
+              <a:rPr lang="en-US" sz="1800" dirty="0"/>
+              <a:t>    },</a:t>
+            </a:r>
+            <a:br>
+              <a:rPr lang="en-US" sz="1800" dirty="0"/>
+            </a:br>
+            <a:r>
+              <a:rPr lang="en-US" sz="1800" dirty="0"/>
+              <a:t>    {</a:t>
+            </a:r>
+            <a:br>
+              <a:rPr lang="en-US" sz="1800" dirty="0"/>
+            </a:br>
+            <a:r>
+              <a:rPr lang="en-US" sz="1800" dirty="0"/>
+              <a:t>        "type": "function",</a:t>
+            </a:r>
+            <a:br>
+              <a:rPr lang="en-US" sz="1800" dirty="0"/>
+            </a:br>
+            <a:r>
+              <a:rPr lang="en-US" sz="1800" dirty="0"/>
+              <a:t>        "function": { "name": "</a:t>
+            </a:r>
+            <a:r>
+              <a:rPr lang="en-US" sz="1800" dirty="0" err="1"/>
+              <a:t>get_n_day_weather_forecast</a:t>
+            </a:r>
+            <a:r>
+              <a:rPr lang="en-US" sz="1800" dirty="0"/>
+              <a:t>", "description": "Get an N-day weather forecast",</a:t>
+            </a:r>
+            <a:br>
+              <a:rPr lang="en-US" sz="1800" dirty="0"/>
+            </a:br>
+            <a:r>
+              <a:rPr lang="en-US" sz="1800" dirty="0"/>
+              <a:t>            "parameters": {</a:t>
+            </a:r>
+            <a:br>
+              <a:rPr lang="en-US" sz="1800" dirty="0"/>
+            </a:br>
+            <a:r>
+              <a:rPr lang="en-US" sz="1800" dirty="0"/>
+              <a:t>                "type": "object",                </a:t>
+            </a:r>
+            <a:br>
+              <a:rPr lang="en-US" sz="1800" dirty="0"/>
+            </a:br>
+            <a:r>
+              <a:rPr lang="en-US" sz="1800" dirty="0"/>
+              <a:t>                "properties": { </a:t>
+            </a:r>
+            <a:br>
+              <a:rPr lang="en-US" sz="1800" dirty="0"/>
+            </a:br>
+            <a:r>
+              <a:rPr lang="en-US" sz="1800" dirty="0"/>
+              <a:t>                       "location": { "type": "string", "description": "The city and state, e.g. San Francisco, CA"},   </a:t>
+            </a:r>
+            <a:br>
+              <a:rPr lang="en-US" sz="1800" dirty="0"/>
+            </a:br>
+            <a:r>
+              <a:rPr lang="en-US" sz="1800" dirty="0"/>
+              <a:t>                       "</a:t>
+            </a:r>
+            <a:r>
+              <a:rPr lang="en-US" sz="1800" dirty="0" err="1"/>
+              <a:t>num_days</a:t>
+            </a:r>
+            <a:r>
+              <a:rPr lang="en-US" sz="1800" dirty="0"/>
+              <a:t>": {"type": "integer", "description": "The number of days to forecast"}</a:t>
+            </a:r>
+            <a:br>
+              <a:rPr lang="en-US" sz="1800" dirty="0"/>
+            </a:br>
+            <a:r>
+              <a:rPr lang="en-US" sz="1800" dirty="0"/>
+              <a:t>                 },</a:t>
+            </a:r>
+            <a:br>
+              <a:rPr lang="en-US" sz="1800" dirty="0"/>
+            </a:br>
+            <a:r>
+              <a:rPr lang="en-US" sz="1800" dirty="0"/>
+              <a:t>                "required": ["location", "</a:t>
+            </a:r>
+            <a:r>
+              <a:rPr lang="en-US" sz="1800" dirty="0" err="1"/>
+              <a:t>num_days</a:t>
+            </a:r>
+            <a:r>
+              <a:rPr lang="en-US" sz="1800" dirty="0"/>
+              <a:t>"]</a:t>
+            </a:r>
+            <a:br>
+              <a:rPr lang="en-US" sz="1800" dirty="0"/>
+            </a:br>
+            <a:r>
+              <a:rPr lang="en-US" sz="1800" dirty="0"/>
+              <a:t>            },</a:t>
+            </a:r>
+            <a:br>
+              <a:rPr lang="en-US" sz="1800" dirty="0"/>
+            </a:br>
+            <a:r>
+              <a:rPr lang="en-US" sz="1800" dirty="0"/>
+              <a:t>        }</a:t>
+            </a:r>
+            <a:br>
+              <a:rPr lang="en-US" sz="1800" dirty="0"/>
+            </a:br>
+            <a:r>
+              <a:rPr lang="en-US" sz="1800" dirty="0"/>
+              <a:t>    },</a:t>
+            </a:r>
+            <a:br>
+              <a:rPr lang="en-US" sz="1800" dirty="0"/>
+            </a:br>
+            <a:r>
+              <a:rPr lang="en-US" sz="1800" dirty="0"/>
+              <a:t>]</a:t>
+            </a:r>
+          </a:p>
+        </p:txBody>
+      </p:sp>
+    </p:spTree>
+    <p:extLst>
+      <p:ext uri="{BB962C8B-B14F-4D97-AF65-F5344CB8AC3E}">
+        <p14:creationId xmlns:p14="http://schemas.microsoft.com/office/powerpoint/2010/main" val="2373887976"/>
+      </p:ext>
+    </p:extLst>
+  </p:cSld>
+  <p:clrMapOvr>
+    <a:masterClrMapping/>
+  </p:clrMapOvr>
+</p:sld>
+</file>
+
+<file path=ppt/slides/slide12.xml><?xml version="1.0" encoding="utf-8"?>
+<p:sld xmlns:a="http://schemas.openxmlformats.org/drawingml/2006/main" xmlns:r="http://schemas.openxmlformats.org/officeDocument/2006/relationships" xmlns:p="http://schemas.openxmlformats.org/presentationml/2006/main">
+  <p:cSld>
+    <p:spTree>
+      <p:nvGrpSpPr>
+        <p:cNvPr id="1" name=""/>
+        <p:cNvGrpSpPr/>
+        <p:nvPr/>
+      </p:nvGrpSpPr>
+      <p:grpSpPr>
+        <a:xfrm>
+          <a:off x="0" y="0"/>
+          <a:ext cx="0" cy="0"/>
+          <a:chOff x="0" y="0"/>
+          <a:chExt cx="0" cy="0"/>
+        </a:xfrm>
+      </p:grpSpPr>
+      <p:sp>
+        <p:nvSpPr>
+          <p:cNvPr id="2" name="Title 1">
+            <a:extLst>
+              <a:ext uri="{FF2B5EF4-FFF2-40B4-BE49-F238E27FC236}">
+                <a16:creationId xmlns:a16="http://schemas.microsoft.com/office/drawing/2014/main" id="{7A3CD463-38BF-B1AD-F428-F521A5C27A15}"/>
+              </a:ext>
+            </a:extLst>
+          </p:cNvPr>
+          <p:cNvSpPr>
+            <a:spLocks noGrp="1"/>
+          </p:cNvSpPr>
+          <p:nvPr>
+            <p:ph type="title"/>
+          </p:nvPr>
+        </p:nvSpPr>
+        <p:spPr/>
+        <p:txBody>
+          <a:bodyPr/>
+          <a:lstStyle/>
+          <a:p>
+            <a:r>
+              <a:rPr lang="en-US" dirty="0"/>
+              <a:t>Migrate function calls to tools-call </a:t>
+            </a:r>
+            <a:br>
+              <a:rPr lang="en-US" dirty="0"/>
+            </a:br>
+            <a:endParaRPr lang="en-US" dirty="0"/>
+          </a:p>
+        </p:txBody>
+      </p:sp>
+      <p:sp>
+        <p:nvSpPr>
+          <p:cNvPr id="3" name="Content Placeholder 2">
+            <a:extLst>
+              <a:ext uri="{FF2B5EF4-FFF2-40B4-BE49-F238E27FC236}">
+                <a16:creationId xmlns:a16="http://schemas.microsoft.com/office/drawing/2014/main" id="{38A01988-4E4F-7E8B-DBEA-CBC2AF8020B6}"/>
+              </a:ext>
+            </a:extLst>
+          </p:cNvPr>
+          <p:cNvSpPr>
+            <a:spLocks noGrp="1"/>
+          </p:cNvSpPr>
+          <p:nvPr>
+            <p:ph idx="1"/>
+          </p:nvPr>
+        </p:nvSpPr>
+        <p:spPr/>
+        <p:txBody>
+          <a:bodyPr/>
+          <a:lstStyle/>
+          <a:p>
+            <a:r>
+              <a:rPr lang="en-US" dirty="0"/>
+              <a:t>Along with the </a:t>
+            </a:r>
+            <a:r>
+              <a:rPr lang="en-US" dirty="0" err="1"/>
+              <a:t>json</a:t>
+            </a:r>
+            <a:r>
+              <a:rPr lang="en-US" dirty="0"/>
+              <a:t> reply from the api, need to pass also the corresponding </a:t>
+            </a:r>
+            <a:r>
+              <a:rPr lang="en-US" dirty="0" err="1"/>
+              <a:t>json</a:t>
+            </a:r>
+            <a:r>
+              <a:rPr lang="en-US" dirty="0"/>
+              <a:t> returned by the ai in previous step (used as input of the api call)</a:t>
+            </a:r>
+          </a:p>
+          <a:p>
+            <a:r>
+              <a:rPr lang="en-US" dirty="0"/>
+              <a:t>Each function call reply has got an </a:t>
+            </a:r>
+            <a:r>
+              <a:rPr lang="en-US" i="1" dirty="0"/>
+              <a:t>id</a:t>
+            </a:r>
+            <a:r>
+              <a:rPr lang="en-US" dirty="0"/>
+              <a:t> that must be "copied" to the corresponding api reply when passing the </a:t>
+            </a:r>
+            <a:r>
+              <a:rPr lang="en-US" dirty="0" err="1"/>
+              <a:t>json</a:t>
+            </a:r>
+            <a:r>
+              <a:rPr lang="en-US" dirty="0"/>
+              <a:t> reply to the ai </a:t>
+            </a:r>
+          </a:p>
+          <a:p>
+            <a:pPr lvl="1"/>
+            <a:r>
+              <a:rPr lang="en-US" dirty="0"/>
+              <a:t>Likely required to correlate input-output of each function call (there could be more than one)</a:t>
+            </a:r>
+          </a:p>
+        </p:txBody>
+      </p:sp>
+    </p:spTree>
+    <p:extLst>
+      <p:ext uri="{BB962C8B-B14F-4D97-AF65-F5344CB8AC3E}">
+        <p14:creationId xmlns:p14="http://schemas.microsoft.com/office/powerpoint/2010/main" val="1882048807"/>
+      </p:ext>
+    </p:extLst>
+  </p:cSld>
+  <p:clrMapOvr>
+    <a:masterClrMapping/>
+  </p:clrMapOvr>
+</p:sld>
+</file>
+
+<file path=ppt/slides/slide13.xml><?xml version="1.0" encoding="utf-8"?>
+<p:sld xmlns:a="http://schemas.openxmlformats.org/drawingml/2006/main" xmlns:r="http://schemas.openxmlformats.org/officeDocument/2006/relationships" xmlns:p="http://schemas.openxmlformats.org/presentationml/2006/main">
+  <p:cSld>
+    <p:spTree>
+      <p:nvGrpSpPr>
+        <p:cNvPr id="1" name=""/>
+        <p:cNvGrpSpPr/>
+        <p:nvPr/>
+      </p:nvGrpSpPr>
+      <p:grpSpPr>
+        <a:xfrm>
+          <a:off x="0" y="0"/>
+          <a:ext cx="0" cy="0"/>
+          <a:chOff x="0" y="0"/>
+          <a:chExt cx="0" cy="0"/>
+        </a:xfrm>
+      </p:grpSpPr>
+      <p:sp>
+        <p:nvSpPr>
+          <p:cNvPr id="2" name="Title 1">
+            <a:extLst>
+              <a:ext uri="{FF2B5EF4-FFF2-40B4-BE49-F238E27FC236}">
+                <a16:creationId xmlns:a16="http://schemas.microsoft.com/office/drawing/2014/main" id="{21C4ECC1-82EF-B64D-D088-64D7586C53F7}"/>
+              </a:ext>
+            </a:extLst>
+          </p:cNvPr>
+          <p:cNvSpPr>
+            <a:spLocks noGrp="1"/>
+          </p:cNvSpPr>
+          <p:nvPr>
+            <p:ph type="title"/>
+          </p:nvPr>
+        </p:nvSpPr>
+        <p:spPr/>
+        <p:txBody>
+          <a:bodyPr/>
+          <a:lstStyle/>
+          <a:p>
+            <a:endParaRPr lang="en-US"/>
+          </a:p>
+        </p:txBody>
+      </p:sp>
+      <p:sp>
+        <p:nvSpPr>
+          <p:cNvPr id="3" name="Content Placeholder 2">
+            <a:extLst>
+              <a:ext uri="{FF2B5EF4-FFF2-40B4-BE49-F238E27FC236}">
+                <a16:creationId xmlns:a16="http://schemas.microsoft.com/office/drawing/2014/main" id="{07A69565-55FA-6904-454D-1F4EE036EA04}"/>
+              </a:ext>
+            </a:extLst>
+          </p:cNvPr>
+          <p:cNvSpPr>
+            <a:spLocks noGrp="1"/>
+          </p:cNvSpPr>
+          <p:nvPr>
+            <p:ph idx="1"/>
+          </p:nvPr>
+        </p:nvSpPr>
+        <p:spPr/>
+        <p:txBody>
+          <a:bodyPr/>
+          <a:lstStyle/>
+          <a:p>
+            <a:r>
+              <a:rPr lang="en-US" dirty="0">
+                <a:hlinkClick r:id="rId2"/>
+              </a:rPr>
+              <a:t>https://platform.openai.com/docs/guides/function-calling</a:t>
+            </a:r>
+            <a:endParaRPr lang="en-US" dirty="0"/>
+          </a:p>
+          <a:p>
+            <a:r>
+              <a:rPr lang="en-US" dirty="0">
+                <a:hlinkClick r:id="rId3"/>
+              </a:rPr>
+              <a:t>https://cookbook.openai.com/examples/how_to_call_functions_with_chat_models</a:t>
+            </a:r>
+            <a:endParaRPr lang="en-US" dirty="0"/>
+          </a:p>
+          <a:p>
+            <a:endParaRPr lang="en-US" dirty="0"/>
+          </a:p>
+        </p:txBody>
+      </p:sp>
+    </p:spTree>
+    <p:extLst>
+      <p:ext uri="{BB962C8B-B14F-4D97-AF65-F5344CB8AC3E}">
+        <p14:creationId xmlns:p14="http://schemas.microsoft.com/office/powerpoint/2010/main" val="2568979085"/>
+      </p:ext>
+    </p:extLst>
+  </p:cSld>
+  <p:clrMapOvr>
+    <a:masterClrMapping/>
+  </p:clrMapOvr>
+</p:sld>
+</file>
+
 <file path=ppt/slides/slide2.xml><?xml version="1.0" encoding="utf-8"?>
 <p:sld xmlns:a="http://schemas.openxmlformats.org/drawingml/2006/main" xmlns:r="http://schemas.openxmlformats.org/officeDocument/2006/relationships" xmlns:p="http://schemas.openxmlformats.org/presentationml/2006/main">
   <p:cSld>
@@ -3521,6 +4164,27 @@
             <a:r>
               <a:rPr lang="en-US" dirty="0"/>
               <a:t>It's a functionality available in the completion-chat api endpoint </a:t>
+            </a:r>
+          </a:p>
+          <a:p>
+            <a:pPr lvl="1"/>
+            <a:r>
+              <a:rPr lang="en-US" dirty="0"/>
+              <a:t>Gpt-3.5 turbo 0613</a:t>
+            </a:r>
+          </a:p>
+          <a:p>
+            <a:pPr lvl="1"/>
+            <a:r>
+              <a:rPr lang="en-US" dirty="0"/>
+              <a:t>gpt-4-0613</a:t>
+            </a:r>
+          </a:p>
+          <a:p>
+            <a:pPr lvl="1"/>
+            <a:r>
+              <a:rPr lang="en-US" dirty="0"/>
+              <a:t>"embedded/abstracted" into tools-calls in gpt-3.5 1106 and gpt-4 1106</a:t>
             </a:r>
           </a:p>
           <a:p>
@@ -3698,7 +4362,7 @@
           <a:p>
             <a:r>
               <a:rPr lang="en-US" dirty="0"/>
-              <a:t>The Json reply from the api call has to be passed to ChatGPT that will make up a human readable reply from the provided </a:t>
+              <a:t>The Json reply from the api call must then be passed to ChatGPT that will make up a human readable reply from the provided </a:t>
             </a:r>
             <a:r>
               <a:rPr lang="en-US" dirty="0" err="1"/>
@@ -3756,7 +4420,7 @@
         <p:spPr>
           <a:xfrm>
             <a:off x="457200" y="427813"/>
-            <a:ext cx="11229474" cy="6186309"/>
+            <a:ext cx="11229474" cy="4801314"/>
           </a:xfrm>
           <a:prstGeom prst="rect">
             <a:avLst/>
@@ -3789,15 +4453,7 @@
           <a:p>
             <a:r>
               <a:rPr lang="en-US" dirty="0"/>
-              <a:t>            "name": "</a:t>
-            </a:r>
-            <a:r>
-              <a:rPr lang="en-US" dirty="0" err="1"/>
-              <a:t>get_current_weather</a:t>
-            </a:r>
-            <a:r>
-              <a:rPr lang="en-US" dirty="0"/>
-              <a:t>",</a:t>
+              <a:t>            "name": "get-weather",</a:t>
             </a:r>
           </a:p>
           <a:p>
@@ -3845,61 +4501,7 @@
           <a:p>
             <a:r>
               <a:rPr lang="en-US" dirty="0"/>
-              <a:t>                    },</a:t>
-            </a:r>
-          </a:p>
-          <a:p>
-            <a:r>
-              <a:rPr lang="en-US" dirty="0"/>
-              <a:t>                    "format": {</a:t>
-            </a:r>
-          </a:p>
-          <a:p>
-            <a:r>
-              <a:rPr lang="en-US" dirty="0"/>
-              <a:t>                        "type": "string",</a:t>
-            </a:r>
-          </a:p>
-          <a:p>
-            <a:r>
-              <a:rPr lang="en-US" dirty="0"/>
-              <a:t>                        "</a:t>
-            </a:r>
-            <a:r>
-              <a:rPr lang="en-US" dirty="0" err="1"/>
-              <a:t>enum</a:t>
-            </a:r>
-            <a:r>
-              <a:rPr lang="en-US" dirty="0"/>
-              <a:t>": ["</a:t>
-            </a:r>
-            <a:r>
-              <a:rPr lang="en-US" dirty="0" err="1"/>
-              <a:t>celsius</a:t>
-            </a:r>
-            <a:r>
-              <a:rPr lang="en-US" dirty="0"/>
-              <a:t>", "</a:t>
-            </a:r>
-            <a:r>
-              <a:rPr lang="en-US" dirty="0" err="1"/>
-              <a:t>fahrenheit</a:t>
-            </a:r>
-            <a:r>
-              <a:rPr lang="en-US" dirty="0"/>
-              <a:t>"],</a:t>
-            </a:r>
-          </a:p>
-          <a:p>
-            <a:r>
-              <a:rPr lang="en-US" dirty="0"/>
-              <a:t>                        "description": "The temperature unit to use. Infer this from the users location.",</a:t>
-            </a:r>
-          </a:p>
-          <a:p>
-            <a:r>
-              <a:rPr lang="en-US" dirty="0"/>
-              <a:t>                    },</a:t>
+              <a:t>                    }</a:t>
             </a:r>
           </a:p>
           <a:p>
@@ -3911,7 +4513,7 @@
           <a:p>
             <a:r>
               <a:rPr lang="en-US" dirty="0"/>
-              <a:t>                "required": ["location", "format"],</a:t>
+              <a:t>                "required": ["location"]</a:t>
             </a:r>
           </a:p>
           <a:p>
@@ -3930,6 +4532,41 @@
             <a:r>
               <a:rPr lang="en-US" dirty="0"/>
               <a:t>    },</a:t>
+            </a:r>
+          </a:p>
+        </p:txBody>
+      </p:sp>
+      <p:sp>
+        <p:nvSpPr>
+          <p:cNvPr id="2" name="TextBox 1">
+            <a:extLst>
+              <a:ext uri="{FF2B5EF4-FFF2-40B4-BE49-F238E27FC236}">
+                <a16:creationId xmlns:a16="http://schemas.microsoft.com/office/drawing/2014/main" id="{11FF27F2-3810-9393-5046-13F258796858}"/>
+              </a:ext>
+            </a:extLst>
+          </p:cNvPr>
+          <p:cNvSpPr txBox="1"/>
+          <p:nvPr/>
+        </p:nvSpPr>
+        <p:spPr>
+          <a:xfrm>
+            <a:off x="950976" y="5678424"/>
+            <a:ext cx="5259197" cy="369332"/>
+          </a:xfrm>
+          <a:prstGeom prst="rect">
+            <a:avLst/>
+          </a:prstGeom>
+          <a:noFill/>
+        </p:spPr>
+        <p:txBody>
+          <a:bodyPr wrap="none" rtlCol="0">
+            <a:spAutoFit/>
+          </a:bodyPr>
+          <a:lstStyle/>
+          <a:p>
+            <a:r>
+              <a:rPr lang="en-US" dirty="0"/>
+              <a:t>Note: no need to document the corresponding output</a:t>
             </a:r>
           </a:p>
         </p:txBody>
@@ -3966,189 +4603,1954 @@
       </p:grpSpPr>
       <p:sp>
         <p:nvSpPr>
-          <p:cNvPr id="2" name="Title 1">
-            <a:extLst>
-              <a:ext uri="{FF2B5EF4-FFF2-40B4-BE49-F238E27FC236}">
-                <a16:creationId xmlns:a16="http://schemas.microsoft.com/office/drawing/2014/main" id="{EBFCB1D2-0B81-312E-ED64-DBBDE9F62224}"/>
-              </a:ext>
-            </a:extLst>
-          </p:cNvPr>
-          <p:cNvSpPr>
-            <a:spLocks noGrp="1"/>
-          </p:cNvSpPr>
-          <p:nvPr>
-            <p:ph type="title"/>
-          </p:nvPr>
-        </p:nvSpPr>
-        <p:spPr/>
-        <p:txBody>
-          <a:bodyPr/>
+          <p:cNvPr id="4" name="Rectangle 3">
+            <a:extLst>
+              <a:ext uri="{FF2B5EF4-FFF2-40B4-BE49-F238E27FC236}">
+                <a16:creationId xmlns:a16="http://schemas.microsoft.com/office/drawing/2014/main" id="{D2C41E20-70BB-EE57-9DCE-0A2EB43DD90C}"/>
+              </a:ext>
+            </a:extLst>
+          </p:cNvPr>
+          <p:cNvSpPr/>
+          <p:nvPr/>
+        </p:nvSpPr>
+        <p:spPr>
+          <a:xfrm>
+            <a:off x="2382475" y="1489352"/>
+            <a:ext cx="67112" cy="4684945"/>
+          </a:xfrm>
+          <a:prstGeom prst="rect">
+            <a:avLst/>
+          </a:prstGeom>
+        </p:spPr>
+        <p:style>
+          <a:lnRef idx="2">
+            <a:schemeClr val="accent1">
+              <a:shade val="15000"/>
+            </a:schemeClr>
+          </a:lnRef>
+          <a:fillRef idx="1">
+            <a:schemeClr val="accent1"/>
+          </a:fillRef>
+          <a:effectRef idx="0">
+            <a:schemeClr val="accent1"/>
+          </a:effectRef>
+          <a:fontRef idx="minor">
+            <a:schemeClr val="lt1"/>
+          </a:fontRef>
+        </p:style>
+        <p:txBody>
+          <a:bodyPr rtlCol="0" anchor="ctr"/>
+          <a:lstStyle/>
+          <a:p>
+            <a:pPr algn="ctr"/>
+            <a:endParaRPr lang="en-US"/>
+          </a:p>
+        </p:txBody>
+      </p:sp>
+      <p:sp>
+        <p:nvSpPr>
+          <p:cNvPr id="5" name="Rectangle 4">
+            <a:extLst>
+              <a:ext uri="{FF2B5EF4-FFF2-40B4-BE49-F238E27FC236}">
+                <a16:creationId xmlns:a16="http://schemas.microsoft.com/office/drawing/2014/main" id="{199E4A24-FC9F-6330-38DB-0C5A5C651D38}"/>
+              </a:ext>
+            </a:extLst>
+          </p:cNvPr>
+          <p:cNvSpPr/>
+          <p:nvPr/>
+        </p:nvSpPr>
+        <p:spPr>
+          <a:xfrm>
+            <a:off x="5294853" y="1489351"/>
+            <a:ext cx="67112" cy="4684945"/>
+          </a:xfrm>
+          <a:prstGeom prst="rect">
+            <a:avLst/>
+          </a:prstGeom>
+        </p:spPr>
+        <p:style>
+          <a:lnRef idx="2">
+            <a:schemeClr val="accent1">
+              <a:shade val="15000"/>
+            </a:schemeClr>
+          </a:lnRef>
+          <a:fillRef idx="1">
+            <a:schemeClr val="accent1"/>
+          </a:fillRef>
+          <a:effectRef idx="0">
+            <a:schemeClr val="accent1"/>
+          </a:effectRef>
+          <a:fontRef idx="minor">
+            <a:schemeClr val="lt1"/>
+          </a:fontRef>
+        </p:style>
+        <p:txBody>
+          <a:bodyPr rtlCol="0" anchor="ctr"/>
+          <a:lstStyle/>
+          <a:p>
+            <a:pPr algn="ctr"/>
+            <a:endParaRPr lang="en-US"/>
+          </a:p>
+        </p:txBody>
+      </p:sp>
+      <p:sp>
+        <p:nvSpPr>
+          <p:cNvPr id="6" name="Rectangle 5">
+            <a:extLst>
+              <a:ext uri="{FF2B5EF4-FFF2-40B4-BE49-F238E27FC236}">
+                <a16:creationId xmlns:a16="http://schemas.microsoft.com/office/drawing/2014/main" id="{F8FDA0C5-011A-F09B-A043-ADB488DCB00A}"/>
+              </a:ext>
+            </a:extLst>
+          </p:cNvPr>
+          <p:cNvSpPr/>
+          <p:nvPr/>
+        </p:nvSpPr>
+        <p:spPr>
+          <a:xfrm>
+            <a:off x="11185321" y="1442335"/>
+            <a:ext cx="67112" cy="4684945"/>
+          </a:xfrm>
+          <a:prstGeom prst="rect">
+            <a:avLst/>
+          </a:prstGeom>
+        </p:spPr>
+        <p:style>
+          <a:lnRef idx="2">
+            <a:schemeClr val="accent1">
+              <a:shade val="15000"/>
+            </a:schemeClr>
+          </a:lnRef>
+          <a:fillRef idx="1">
+            <a:schemeClr val="accent1"/>
+          </a:fillRef>
+          <a:effectRef idx="0">
+            <a:schemeClr val="accent1"/>
+          </a:effectRef>
+          <a:fontRef idx="minor">
+            <a:schemeClr val="lt1"/>
+          </a:fontRef>
+        </p:style>
+        <p:txBody>
+          <a:bodyPr rtlCol="0" anchor="ctr"/>
+          <a:lstStyle/>
+          <a:p>
+            <a:pPr algn="ctr"/>
+            <a:endParaRPr lang="en-US"/>
+          </a:p>
+        </p:txBody>
+      </p:sp>
+      <p:cxnSp>
+        <p:nvCxnSpPr>
+          <p:cNvPr id="8" name="Straight Arrow Connector 7">
+            <a:extLst>
+              <a:ext uri="{FF2B5EF4-FFF2-40B4-BE49-F238E27FC236}">
+                <a16:creationId xmlns:a16="http://schemas.microsoft.com/office/drawing/2014/main" id="{6FEC4BBE-27D9-E350-0349-13D0767633A6}"/>
+              </a:ext>
+            </a:extLst>
+          </p:cNvPr>
+          <p:cNvCxnSpPr>
+            <a:cxnSpLocks/>
+          </p:cNvCxnSpPr>
+          <p:nvPr/>
+        </p:nvCxnSpPr>
+        <p:spPr>
+          <a:xfrm>
+            <a:off x="192947" y="1963024"/>
+            <a:ext cx="5048077" cy="0"/>
+          </a:xfrm>
+          <a:prstGeom prst="straightConnector1">
+            <a:avLst/>
+          </a:prstGeom>
+          <a:ln>
+            <a:tailEnd type="triangle"/>
+          </a:ln>
+        </p:spPr>
+        <p:style>
+          <a:lnRef idx="1">
+            <a:schemeClr val="accent1"/>
+          </a:lnRef>
+          <a:fillRef idx="0">
+            <a:schemeClr val="accent1"/>
+          </a:fillRef>
+          <a:effectRef idx="0">
+            <a:schemeClr val="accent1"/>
+          </a:effectRef>
+          <a:fontRef idx="minor">
+            <a:schemeClr val="tx1"/>
+          </a:fontRef>
+        </p:style>
+      </p:cxnSp>
+      <p:cxnSp>
+        <p:nvCxnSpPr>
+          <p:cNvPr id="9" name="Straight Arrow Connector 8">
+            <a:extLst>
+              <a:ext uri="{FF2B5EF4-FFF2-40B4-BE49-F238E27FC236}">
+                <a16:creationId xmlns:a16="http://schemas.microsoft.com/office/drawing/2014/main" id="{461075B4-FB28-400F-F4C3-BACA2B9C5EDE}"/>
+              </a:ext>
+            </a:extLst>
+          </p:cNvPr>
+          <p:cNvCxnSpPr>
+            <a:cxnSpLocks/>
+          </p:cNvCxnSpPr>
+          <p:nvPr/>
+        </p:nvCxnSpPr>
+        <p:spPr>
+          <a:xfrm flipH="1">
+            <a:off x="220211" y="2148980"/>
+            <a:ext cx="5020813" cy="0"/>
+          </a:xfrm>
+          <a:prstGeom prst="straightConnector1">
+            <a:avLst/>
+          </a:prstGeom>
+          <a:ln>
+            <a:tailEnd type="triangle"/>
+          </a:ln>
+        </p:spPr>
+        <p:style>
+          <a:lnRef idx="1">
+            <a:schemeClr val="accent1"/>
+          </a:lnRef>
+          <a:fillRef idx="0">
+            <a:schemeClr val="accent1"/>
+          </a:fillRef>
+          <a:effectRef idx="0">
+            <a:schemeClr val="accent1"/>
+          </a:effectRef>
+          <a:fontRef idx="minor">
+            <a:schemeClr val="tx1"/>
+          </a:fontRef>
+        </p:style>
+      </p:cxnSp>
+      <p:cxnSp>
+        <p:nvCxnSpPr>
+          <p:cNvPr id="12" name="Straight Arrow Connector 11">
+            <a:extLst>
+              <a:ext uri="{FF2B5EF4-FFF2-40B4-BE49-F238E27FC236}">
+                <a16:creationId xmlns:a16="http://schemas.microsoft.com/office/drawing/2014/main" id="{F18E9915-9753-E859-E47D-93D021D62978}"/>
+              </a:ext>
+            </a:extLst>
+          </p:cNvPr>
+          <p:cNvCxnSpPr>
+            <a:cxnSpLocks/>
+          </p:cNvCxnSpPr>
+          <p:nvPr/>
+        </p:nvCxnSpPr>
+        <p:spPr>
+          <a:xfrm>
+            <a:off x="192947" y="3180825"/>
+            <a:ext cx="5048077" cy="0"/>
+          </a:xfrm>
+          <a:prstGeom prst="straightConnector1">
+            <a:avLst/>
+          </a:prstGeom>
+          <a:ln>
+            <a:tailEnd type="triangle"/>
+          </a:ln>
+        </p:spPr>
+        <p:style>
+          <a:lnRef idx="1">
+            <a:schemeClr val="accent1"/>
+          </a:lnRef>
+          <a:fillRef idx="0">
+            <a:schemeClr val="accent1"/>
+          </a:fillRef>
+          <a:effectRef idx="0">
+            <a:schemeClr val="accent1"/>
+          </a:effectRef>
+          <a:fontRef idx="minor">
+            <a:schemeClr val="tx1"/>
+          </a:fontRef>
+        </p:style>
+      </p:cxnSp>
+      <p:cxnSp>
+        <p:nvCxnSpPr>
+          <p:cNvPr id="13" name="Straight Arrow Connector 12">
+            <a:extLst>
+              <a:ext uri="{FF2B5EF4-FFF2-40B4-BE49-F238E27FC236}">
+                <a16:creationId xmlns:a16="http://schemas.microsoft.com/office/drawing/2014/main" id="{667890AF-F2BB-2671-5A2D-8044C740D1F9}"/>
+              </a:ext>
+            </a:extLst>
+          </p:cNvPr>
+          <p:cNvCxnSpPr>
+            <a:cxnSpLocks/>
+          </p:cNvCxnSpPr>
+          <p:nvPr/>
+        </p:nvCxnSpPr>
+        <p:spPr>
+          <a:xfrm flipH="1">
+            <a:off x="2449587" y="3426903"/>
+            <a:ext cx="2794932" cy="0"/>
+          </a:xfrm>
+          <a:prstGeom prst="straightConnector1">
+            <a:avLst/>
+          </a:prstGeom>
+          <a:ln>
+            <a:tailEnd type="triangle"/>
+          </a:ln>
+        </p:spPr>
+        <p:style>
+          <a:lnRef idx="2">
+            <a:schemeClr val="accent2"/>
+          </a:lnRef>
+          <a:fillRef idx="0">
+            <a:schemeClr val="accent2"/>
+          </a:fillRef>
+          <a:effectRef idx="1">
+            <a:schemeClr val="accent2"/>
+          </a:effectRef>
+          <a:fontRef idx="minor">
+            <a:schemeClr val="tx1"/>
+          </a:fontRef>
+        </p:style>
+      </p:cxnSp>
+      <p:cxnSp>
+        <p:nvCxnSpPr>
+          <p:cNvPr id="14" name="Straight Arrow Connector 13">
+            <a:extLst>
+              <a:ext uri="{FF2B5EF4-FFF2-40B4-BE49-F238E27FC236}">
+                <a16:creationId xmlns:a16="http://schemas.microsoft.com/office/drawing/2014/main" id="{81E74C8A-D851-75A6-8BD3-16A2FDFCAEFA}"/>
+              </a:ext>
+            </a:extLst>
+          </p:cNvPr>
+          <p:cNvCxnSpPr>
+            <a:cxnSpLocks/>
+          </p:cNvCxnSpPr>
+          <p:nvPr/>
+        </p:nvCxnSpPr>
+        <p:spPr>
+          <a:xfrm>
+            <a:off x="2499921" y="3604244"/>
+            <a:ext cx="8598714" cy="0"/>
+          </a:xfrm>
+          <a:prstGeom prst="straightConnector1">
+            <a:avLst/>
+          </a:prstGeom>
+          <a:ln>
+            <a:tailEnd type="triangle"/>
+          </a:ln>
+        </p:spPr>
+        <p:style>
+          <a:lnRef idx="2">
+            <a:schemeClr val="accent2"/>
+          </a:lnRef>
+          <a:fillRef idx="0">
+            <a:schemeClr val="accent2"/>
+          </a:fillRef>
+          <a:effectRef idx="1">
+            <a:schemeClr val="accent2"/>
+          </a:effectRef>
+          <a:fontRef idx="minor">
+            <a:schemeClr val="tx1"/>
+          </a:fontRef>
+        </p:style>
+      </p:cxnSp>
+      <p:cxnSp>
+        <p:nvCxnSpPr>
+          <p:cNvPr id="16" name="Straight Arrow Connector 15">
+            <a:extLst>
+              <a:ext uri="{FF2B5EF4-FFF2-40B4-BE49-F238E27FC236}">
+                <a16:creationId xmlns:a16="http://schemas.microsoft.com/office/drawing/2014/main" id="{0D6A7CFC-387A-F949-91EA-8B1E6DE2AAB1}"/>
+              </a:ext>
+            </a:extLst>
+          </p:cNvPr>
+          <p:cNvCxnSpPr/>
+          <p:nvPr/>
+        </p:nvCxnSpPr>
+        <p:spPr>
+          <a:xfrm>
+            <a:off x="2499921" y="4423795"/>
+            <a:ext cx="2794932" cy="0"/>
+          </a:xfrm>
+          <a:prstGeom prst="straightConnector1">
+            <a:avLst/>
+          </a:prstGeom>
+          <a:ln>
+            <a:tailEnd type="triangle"/>
+          </a:ln>
+        </p:spPr>
+        <p:style>
+          <a:lnRef idx="2">
+            <a:schemeClr val="accent2"/>
+          </a:lnRef>
+          <a:fillRef idx="0">
+            <a:schemeClr val="accent2"/>
+          </a:fillRef>
+          <a:effectRef idx="1">
+            <a:schemeClr val="accent2"/>
+          </a:effectRef>
+          <a:fontRef idx="minor">
+            <a:schemeClr val="tx1"/>
+          </a:fontRef>
+        </p:style>
+      </p:cxnSp>
+      <p:cxnSp>
+        <p:nvCxnSpPr>
+          <p:cNvPr id="17" name="Straight Arrow Connector 16">
+            <a:extLst>
+              <a:ext uri="{FF2B5EF4-FFF2-40B4-BE49-F238E27FC236}">
+                <a16:creationId xmlns:a16="http://schemas.microsoft.com/office/drawing/2014/main" id="{F0546C6C-EB6E-E579-B98D-21932CC631D0}"/>
+              </a:ext>
+            </a:extLst>
+          </p:cNvPr>
+          <p:cNvCxnSpPr>
+            <a:cxnSpLocks/>
+          </p:cNvCxnSpPr>
+          <p:nvPr/>
+        </p:nvCxnSpPr>
+        <p:spPr>
+          <a:xfrm flipH="1" flipV="1">
+            <a:off x="220211" y="5507372"/>
+            <a:ext cx="5074642" cy="51058"/>
+          </a:xfrm>
+          <a:prstGeom prst="straightConnector1">
+            <a:avLst/>
+          </a:prstGeom>
+          <a:ln>
+            <a:tailEnd type="triangle"/>
+          </a:ln>
+        </p:spPr>
+        <p:style>
+          <a:lnRef idx="1">
+            <a:schemeClr val="accent1"/>
+          </a:lnRef>
+          <a:fillRef idx="0">
+            <a:schemeClr val="accent1"/>
+          </a:fillRef>
+          <a:effectRef idx="0">
+            <a:schemeClr val="accent1"/>
+          </a:effectRef>
+          <a:fontRef idx="minor">
+            <a:schemeClr val="tx1"/>
+          </a:fontRef>
+        </p:style>
+      </p:cxnSp>
+      <p:cxnSp>
+        <p:nvCxnSpPr>
+          <p:cNvPr id="18" name="Straight Arrow Connector 17">
+            <a:extLst>
+              <a:ext uri="{FF2B5EF4-FFF2-40B4-BE49-F238E27FC236}">
+                <a16:creationId xmlns:a16="http://schemas.microsoft.com/office/drawing/2014/main" id="{49996111-4D26-9D58-B814-97E8B02EFC58}"/>
+              </a:ext>
+            </a:extLst>
+          </p:cNvPr>
+          <p:cNvCxnSpPr>
+            <a:cxnSpLocks/>
+          </p:cNvCxnSpPr>
+          <p:nvPr/>
+        </p:nvCxnSpPr>
+        <p:spPr>
+          <a:xfrm flipH="1">
+            <a:off x="2499921" y="3831822"/>
+            <a:ext cx="8598714" cy="0"/>
+          </a:xfrm>
+          <a:prstGeom prst="straightConnector1">
+            <a:avLst/>
+          </a:prstGeom>
+          <a:ln>
+            <a:tailEnd type="triangle"/>
+          </a:ln>
+        </p:spPr>
+        <p:style>
+          <a:lnRef idx="2">
+            <a:schemeClr val="accent2"/>
+          </a:lnRef>
+          <a:fillRef idx="0">
+            <a:schemeClr val="accent2"/>
+          </a:fillRef>
+          <a:effectRef idx="1">
+            <a:schemeClr val="accent2"/>
+          </a:effectRef>
+          <a:fontRef idx="minor">
+            <a:schemeClr val="tx1"/>
+          </a:fontRef>
+        </p:style>
+      </p:cxnSp>
+      <p:sp>
+        <p:nvSpPr>
+          <p:cNvPr id="20" name="Callout: Line with Border and Accent Bar 19">
+            <a:extLst>
+              <a:ext uri="{FF2B5EF4-FFF2-40B4-BE49-F238E27FC236}">
+                <a16:creationId xmlns:a16="http://schemas.microsoft.com/office/drawing/2014/main" id="{4E8EA378-9474-8650-375A-B9C5F80CE253}"/>
+              </a:ext>
+            </a:extLst>
+          </p:cNvPr>
+          <p:cNvSpPr/>
+          <p:nvPr/>
+        </p:nvSpPr>
+        <p:spPr>
+          <a:xfrm>
+            <a:off x="3305264" y="1136011"/>
+            <a:ext cx="1803633" cy="612648"/>
+          </a:xfrm>
+          <a:prstGeom prst="accentBorderCallout1">
+            <a:avLst>
+              <a:gd name="adj1" fmla="val 18750"/>
+              <a:gd name="adj2" fmla="val -8333"/>
+              <a:gd name="adj3" fmla="val 128932"/>
+              <a:gd name="adj4" fmla="val -37868"/>
+            </a:avLst>
+          </a:prstGeom>
+          <a:solidFill>
+            <a:schemeClr val="accent4">
+              <a:lumMod val="20000"/>
+              <a:lumOff val="80000"/>
+            </a:schemeClr>
+          </a:solidFill>
+        </p:spPr>
+        <p:style>
+          <a:lnRef idx="2">
+            <a:schemeClr val="accent1">
+              <a:shade val="15000"/>
+            </a:schemeClr>
+          </a:lnRef>
+          <a:fillRef idx="1">
+            <a:schemeClr val="accent1"/>
+          </a:fillRef>
+          <a:effectRef idx="0">
+            <a:schemeClr val="accent1"/>
+          </a:effectRef>
+          <a:fontRef idx="minor">
+            <a:schemeClr val="lt1"/>
+          </a:fontRef>
+        </p:style>
+        <p:txBody>
+          <a:bodyPr rtlCol="0" anchor="ctr"/>
+          <a:lstStyle/>
+          <a:p>
+            <a:pPr algn="ctr"/>
+            <a:r>
+              <a:rPr lang="en-US" sz="1200" dirty="0">
+                <a:solidFill>
+                  <a:schemeClr val="tx1"/>
+                </a:solidFill>
+              </a:rPr>
+              <a:t>- function: get-weather</a:t>
+            </a:r>
+            <a:br>
+              <a:rPr lang="en-US" sz="1200" dirty="0">
+                <a:solidFill>
+                  <a:schemeClr val="tx1"/>
+                </a:solidFill>
+              </a:rPr>
+            </a:br>
+            <a:r>
+              <a:rPr lang="en-US" sz="1200" dirty="0">
+                <a:solidFill>
+                  <a:schemeClr val="tx1"/>
+                </a:solidFill>
+              </a:rPr>
+              <a:t>- user : "how is the weather today?"</a:t>
+            </a:r>
+          </a:p>
+        </p:txBody>
+      </p:sp>
+      <p:sp>
+        <p:nvSpPr>
+          <p:cNvPr id="21" name="Callout: Line with Border and Accent Bar 20">
+            <a:extLst>
+              <a:ext uri="{FF2B5EF4-FFF2-40B4-BE49-F238E27FC236}">
+                <a16:creationId xmlns:a16="http://schemas.microsoft.com/office/drawing/2014/main" id="{46509E57-EC1E-77E4-E8A6-2472D2ED7B5D}"/>
+              </a:ext>
+            </a:extLst>
+          </p:cNvPr>
+          <p:cNvSpPr/>
+          <p:nvPr/>
+        </p:nvSpPr>
+        <p:spPr>
+          <a:xfrm>
+            <a:off x="3305264" y="2230003"/>
+            <a:ext cx="1866551" cy="823520"/>
+          </a:xfrm>
+          <a:prstGeom prst="accentBorderCallout1">
+            <a:avLst/>
+          </a:prstGeom>
+          <a:solidFill>
+            <a:schemeClr val="accent4">
+              <a:lumMod val="20000"/>
+              <a:lumOff val="80000"/>
+            </a:schemeClr>
+          </a:solidFill>
+        </p:spPr>
+        <p:style>
+          <a:lnRef idx="2">
+            <a:schemeClr val="accent1">
+              <a:shade val="15000"/>
+            </a:schemeClr>
+          </a:lnRef>
+          <a:fillRef idx="1">
+            <a:schemeClr val="accent1"/>
+          </a:fillRef>
+          <a:effectRef idx="0">
+            <a:schemeClr val="accent1"/>
+          </a:effectRef>
+          <a:fontRef idx="minor">
+            <a:schemeClr val="lt1"/>
+          </a:fontRef>
+        </p:style>
+        <p:txBody>
+          <a:bodyPr rtlCol="0" anchor="ctr"/>
+          <a:lstStyle/>
+          <a:p>
+            <a:pPr algn="ctr"/>
+            <a:r>
+              <a:rPr lang="en-US" sz="1200" dirty="0">
+                <a:solidFill>
+                  <a:schemeClr val="tx1"/>
+                </a:solidFill>
+              </a:rPr>
+              <a:t>- function: Get-weather</a:t>
+            </a:r>
+            <a:br>
+              <a:rPr lang="en-US" sz="1200" dirty="0">
+                <a:solidFill>
+                  <a:schemeClr val="tx1"/>
+                </a:solidFill>
+              </a:rPr>
+            </a:br>
+            <a:r>
+              <a:rPr lang="en-US" sz="1200" dirty="0">
+                <a:solidFill>
+                  <a:schemeClr val="tx1"/>
+                </a:solidFill>
+              </a:rPr>
+              <a:t>- conversation history </a:t>
+            </a:r>
+            <a:br>
+              <a:rPr lang="en-US" sz="1200" dirty="0">
+                <a:solidFill>
+                  <a:schemeClr val="tx1"/>
+                </a:solidFill>
+              </a:rPr>
+            </a:br>
+            <a:r>
+              <a:rPr lang="en-US" sz="1200" dirty="0">
+                <a:solidFill>
+                  <a:schemeClr val="tx1"/>
+                </a:solidFill>
+              </a:rPr>
+              <a:t>- user: "how is the weather today in London ?"</a:t>
+            </a:r>
+          </a:p>
+        </p:txBody>
+      </p:sp>
+      <p:sp>
+        <p:nvSpPr>
+          <p:cNvPr id="22" name="Callout: Line with Border and Accent Bar 21">
+            <a:extLst>
+              <a:ext uri="{FF2B5EF4-FFF2-40B4-BE49-F238E27FC236}">
+                <a16:creationId xmlns:a16="http://schemas.microsoft.com/office/drawing/2014/main" id="{9E28DCCE-A049-6E38-B24B-ED2ADEEDD4F4}"/>
+              </a:ext>
+            </a:extLst>
+          </p:cNvPr>
+          <p:cNvSpPr/>
+          <p:nvPr/>
+        </p:nvSpPr>
+        <p:spPr>
+          <a:xfrm>
+            <a:off x="6931405" y="1123174"/>
+            <a:ext cx="1803633" cy="612648"/>
+          </a:xfrm>
+          <a:prstGeom prst="accentBorderCallout1">
+            <a:avLst>
+              <a:gd name="adj1" fmla="val 18750"/>
+              <a:gd name="adj2" fmla="val -8333"/>
+              <a:gd name="adj3" fmla="val 157667"/>
+              <a:gd name="adj4" fmla="val -117724"/>
+            </a:avLst>
+          </a:prstGeom>
+          <a:solidFill>
+            <a:schemeClr val="bg2"/>
+          </a:solidFill>
+        </p:spPr>
+        <p:style>
+          <a:lnRef idx="2">
+            <a:schemeClr val="accent1">
+              <a:shade val="15000"/>
+            </a:schemeClr>
+          </a:lnRef>
+          <a:fillRef idx="1">
+            <a:schemeClr val="accent1"/>
+          </a:fillRef>
+          <a:effectRef idx="0">
+            <a:schemeClr val="accent1"/>
+          </a:effectRef>
+          <a:fontRef idx="minor">
+            <a:schemeClr val="lt1"/>
+          </a:fontRef>
+        </p:style>
+        <p:txBody>
+          <a:bodyPr rtlCol="0" anchor="ctr"/>
+          <a:lstStyle/>
+          <a:p>
+            <a:pPr algn="ctr"/>
+            <a:r>
+              <a:rPr lang="en-US" sz="1200" dirty="0">
+                <a:solidFill>
+                  <a:schemeClr val="tx1"/>
+                </a:solidFill>
+              </a:rPr>
+              <a:t>A: Please specify the location </a:t>
+            </a:r>
+          </a:p>
+        </p:txBody>
+      </p:sp>
+      <p:sp>
+        <p:nvSpPr>
+          <p:cNvPr id="23" name="Callout: Line with Border and Accent Bar 22">
+            <a:extLst>
+              <a:ext uri="{FF2B5EF4-FFF2-40B4-BE49-F238E27FC236}">
+                <a16:creationId xmlns:a16="http://schemas.microsoft.com/office/drawing/2014/main" id="{2D496048-2991-5838-D924-F459D741EF4F}"/>
+              </a:ext>
+            </a:extLst>
+          </p:cNvPr>
+          <p:cNvSpPr/>
+          <p:nvPr/>
+        </p:nvSpPr>
+        <p:spPr>
+          <a:xfrm>
+            <a:off x="6774811" y="2241634"/>
+            <a:ext cx="1803633" cy="612648"/>
+          </a:xfrm>
+          <a:prstGeom prst="accentBorderCallout1">
+            <a:avLst>
+              <a:gd name="adj1" fmla="val 18750"/>
+              <a:gd name="adj2" fmla="val -8333"/>
+              <a:gd name="adj3" fmla="val 189180"/>
+              <a:gd name="adj4" fmla="val -106240"/>
+            </a:avLst>
+          </a:prstGeom>
+          <a:solidFill>
+            <a:schemeClr val="bg2"/>
+          </a:solidFill>
+        </p:spPr>
+        <p:style>
+          <a:lnRef idx="2">
+            <a:schemeClr val="accent1">
+              <a:shade val="15000"/>
+            </a:schemeClr>
+          </a:lnRef>
+          <a:fillRef idx="1">
+            <a:schemeClr val="accent1"/>
+          </a:fillRef>
+          <a:effectRef idx="0">
+            <a:schemeClr val="accent1"/>
+          </a:effectRef>
+          <a:fontRef idx="minor">
+            <a:schemeClr val="lt1"/>
+          </a:fontRef>
+        </p:style>
+        <p:txBody>
+          <a:bodyPr rtlCol="0" anchor="ctr"/>
+          <a:lstStyle/>
+          <a:p>
+            <a:pPr algn="ctr"/>
+            <a:r>
+              <a:rPr lang="en-US" sz="1200" dirty="0">
+                <a:solidFill>
+                  <a:schemeClr val="tx1"/>
+                </a:solidFill>
+              </a:rPr>
+              <a:t>A: function "get-weather"</a:t>
+            </a:r>
+            <a:br>
+              <a:rPr lang="en-US" sz="1200" dirty="0">
+                <a:solidFill>
+                  <a:schemeClr val="tx1"/>
+                </a:solidFill>
+              </a:rPr>
+            </a:br>
+            <a:r>
+              <a:rPr lang="en-US" sz="1200" i="1" dirty="0">
+                <a:solidFill>
+                  <a:schemeClr val="tx1"/>
+                </a:solidFill>
+              </a:rPr>
+              <a:t>{ "location" : "London" }</a:t>
+            </a:r>
+            <a:br>
+              <a:rPr lang="en-US" sz="1200" i="1" dirty="0">
+                <a:solidFill>
+                  <a:schemeClr val="tx1"/>
+                </a:solidFill>
+              </a:rPr>
+            </a:br>
+            <a:endParaRPr lang="en-US" sz="1200" i="1" dirty="0">
+              <a:solidFill>
+                <a:schemeClr val="tx1"/>
+              </a:solidFill>
+            </a:endParaRPr>
+          </a:p>
+        </p:txBody>
+      </p:sp>
+      <p:sp>
+        <p:nvSpPr>
+          <p:cNvPr id="24" name="Callout: Line with Border and Accent Bar 23">
+            <a:extLst>
+              <a:ext uri="{FF2B5EF4-FFF2-40B4-BE49-F238E27FC236}">
+                <a16:creationId xmlns:a16="http://schemas.microsoft.com/office/drawing/2014/main" id="{B2B952EF-A129-7035-4FC4-9A7F7E784ABD}"/>
+              </a:ext>
+            </a:extLst>
+          </p:cNvPr>
+          <p:cNvSpPr/>
+          <p:nvPr/>
+        </p:nvSpPr>
+        <p:spPr>
+          <a:xfrm>
+            <a:off x="6867790" y="2940645"/>
+            <a:ext cx="2320954" cy="612648"/>
+          </a:xfrm>
+          <a:prstGeom prst="accentBorderCallout1">
+            <a:avLst>
+              <a:gd name="adj1" fmla="val 18750"/>
+              <a:gd name="adj2" fmla="val -8333"/>
+              <a:gd name="adj3" fmla="val 104285"/>
+              <a:gd name="adj4" fmla="val -41948"/>
+            </a:avLst>
+          </a:prstGeom>
+          <a:solidFill>
+            <a:schemeClr val="bg1"/>
+          </a:solidFill>
+        </p:spPr>
+        <p:style>
+          <a:lnRef idx="2">
+            <a:schemeClr val="accent1">
+              <a:shade val="15000"/>
+            </a:schemeClr>
+          </a:lnRef>
+          <a:fillRef idx="1">
+            <a:schemeClr val="accent1"/>
+          </a:fillRef>
+          <a:effectRef idx="0">
+            <a:schemeClr val="accent1"/>
+          </a:effectRef>
+          <a:fontRef idx="minor">
+            <a:schemeClr val="lt1"/>
+          </a:fontRef>
+        </p:style>
+        <p:txBody>
+          <a:bodyPr rtlCol="0" anchor="ctr"/>
+          <a:lstStyle/>
+          <a:p>
+            <a:pPr algn="ctr"/>
+            <a:r>
+              <a:rPr lang="en-US" sz="1200" dirty="0">
+                <a:solidFill>
+                  <a:schemeClr val="tx1"/>
+                </a:solidFill>
+              </a:rPr>
+              <a:t>api call  : </a:t>
+            </a:r>
+            <a:r>
+              <a:rPr lang="en-US" sz="1200" b="1" i="1" dirty="0">
+                <a:solidFill>
+                  <a:schemeClr val="tx1"/>
+                </a:solidFill>
+              </a:rPr>
+              <a:t>https://../api/weather/</a:t>
+            </a:r>
+            <a:r>
+              <a:rPr lang="en-US" sz="1200" dirty="0">
+                <a:solidFill>
+                  <a:schemeClr val="tx1"/>
+                </a:solidFill>
+              </a:rPr>
+              <a:t> </a:t>
+            </a:r>
+            <a:r>
+              <a:rPr lang="en-US" sz="1200" i="1" dirty="0">
+                <a:solidFill>
+                  <a:schemeClr val="tx1"/>
+                </a:solidFill>
+              </a:rPr>
+              <a:t>{ "location" : "London" }</a:t>
+            </a:r>
+            <a:br>
+              <a:rPr lang="en-US" sz="1200" i="1" dirty="0">
+                <a:solidFill>
+                  <a:schemeClr val="tx1"/>
+                </a:solidFill>
+              </a:rPr>
+            </a:br>
+            <a:endParaRPr lang="en-US" sz="1200" i="1" dirty="0">
+              <a:solidFill>
+                <a:schemeClr val="tx1"/>
+              </a:solidFill>
+            </a:endParaRPr>
+          </a:p>
+        </p:txBody>
+      </p:sp>
+      <p:sp>
+        <p:nvSpPr>
+          <p:cNvPr id="25" name="Callout: Line with Border and Accent Bar 24">
+            <a:extLst>
+              <a:ext uri="{FF2B5EF4-FFF2-40B4-BE49-F238E27FC236}">
+                <a16:creationId xmlns:a16="http://schemas.microsoft.com/office/drawing/2014/main" id="{02F4EDA0-BF67-DC54-2A3B-0D6592D49E8F}"/>
+              </a:ext>
+            </a:extLst>
+          </p:cNvPr>
+          <p:cNvSpPr/>
+          <p:nvPr/>
+        </p:nvSpPr>
+        <p:spPr>
+          <a:xfrm>
+            <a:off x="6672745" y="4047883"/>
+            <a:ext cx="2320954" cy="612648"/>
+          </a:xfrm>
+          <a:prstGeom prst="accentBorderCallout1">
+            <a:avLst>
+              <a:gd name="adj1" fmla="val 18750"/>
+              <a:gd name="adj2" fmla="val -8333"/>
+              <a:gd name="adj3" fmla="val -28538"/>
+              <a:gd name="adj4" fmla="val -38695"/>
+            </a:avLst>
+          </a:prstGeom>
+          <a:solidFill>
+            <a:schemeClr val="bg1"/>
+          </a:solidFill>
+        </p:spPr>
+        <p:style>
+          <a:lnRef idx="2">
+            <a:schemeClr val="accent1">
+              <a:shade val="15000"/>
+            </a:schemeClr>
+          </a:lnRef>
+          <a:fillRef idx="1">
+            <a:schemeClr val="accent1"/>
+          </a:fillRef>
+          <a:effectRef idx="0">
+            <a:schemeClr val="accent1"/>
+          </a:effectRef>
+          <a:fontRef idx="minor">
+            <a:schemeClr val="lt1"/>
+          </a:fontRef>
+        </p:style>
+        <p:txBody>
+          <a:bodyPr rtlCol="0" anchor="ctr"/>
+          <a:lstStyle/>
+          <a:p>
+            <a:pPr algn="ctr"/>
+            <a:r>
+              <a:rPr lang="en-US" sz="1200" dirty="0">
+                <a:solidFill>
+                  <a:schemeClr val="tx1"/>
+                </a:solidFill>
+              </a:rPr>
+              <a:t>api reply  </a:t>
+            </a:r>
+            <a:r>
+              <a:rPr lang="en-US" sz="1200" i="1" dirty="0">
+                <a:solidFill>
+                  <a:schemeClr val="tx1"/>
+                </a:solidFill>
+              </a:rPr>
+              <a:t>: { "location" : "London" , "weather" : "rainy", temperature : "17" }</a:t>
+            </a:r>
+          </a:p>
+        </p:txBody>
+      </p:sp>
+      <p:sp>
+        <p:nvSpPr>
+          <p:cNvPr id="26" name="Callout: Line with Border and Accent Bar 25">
+            <a:extLst>
+              <a:ext uri="{FF2B5EF4-FFF2-40B4-BE49-F238E27FC236}">
+                <a16:creationId xmlns:a16="http://schemas.microsoft.com/office/drawing/2014/main" id="{7D5B9656-3FD0-2410-E578-96C420C160AD}"/>
+              </a:ext>
+            </a:extLst>
+          </p:cNvPr>
+          <p:cNvSpPr/>
+          <p:nvPr/>
+        </p:nvSpPr>
+        <p:spPr>
+          <a:xfrm>
+            <a:off x="6637792" y="5059508"/>
+            <a:ext cx="2320954" cy="997844"/>
+          </a:xfrm>
+          <a:prstGeom prst="accentBorderCallout1">
+            <a:avLst>
+              <a:gd name="adj1" fmla="val 18750"/>
+              <a:gd name="adj2" fmla="val -8333"/>
+              <a:gd name="adj3" fmla="val -61401"/>
+              <a:gd name="adj4" fmla="val -82430"/>
+            </a:avLst>
+          </a:prstGeom>
+          <a:solidFill>
+            <a:schemeClr val="accent4">
+              <a:lumMod val="20000"/>
+              <a:lumOff val="80000"/>
+            </a:schemeClr>
+          </a:solidFill>
+        </p:spPr>
+        <p:style>
+          <a:lnRef idx="2">
+            <a:schemeClr val="accent1">
+              <a:shade val="15000"/>
+            </a:schemeClr>
+          </a:lnRef>
+          <a:fillRef idx="1">
+            <a:schemeClr val="accent1"/>
+          </a:fillRef>
+          <a:effectRef idx="0">
+            <a:schemeClr val="accent1"/>
+          </a:effectRef>
+          <a:fontRef idx="minor">
+            <a:schemeClr val="lt1"/>
+          </a:fontRef>
+        </p:style>
+        <p:txBody>
+          <a:bodyPr rtlCol="0" anchor="ctr"/>
+          <a:lstStyle/>
+          <a:p>
+            <a:pPr algn="ctr"/>
+            <a:r>
+              <a:rPr lang="en-US" sz="1200" dirty="0">
+                <a:solidFill>
+                  <a:schemeClr val="tx1"/>
+                </a:solidFill>
+              </a:rPr>
+              <a:t>function: none</a:t>
+            </a:r>
+            <a:br>
+              <a:rPr lang="en-US" sz="1200" dirty="0">
+                <a:solidFill>
+                  <a:schemeClr val="tx1"/>
+                </a:solidFill>
+              </a:rPr>
+            </a:br>
+            <a:r>
+              <a:rPr lang="en-US" sz="1200" dirty="0">
+                <a:solidFill>
+                  <a:schemeClr val="tx1"/>
+                </a:solidFill>
+              </a:rPr>
+              <a:t>conversation history </a:t>
+            </a:r>
+            <a:br>
+              <a:rPr lang="en-US" sz="1200" dirty="0">
+                <a:solidFill>
+                  <a:schemeClr val="tx1"/>
+                </a:solidFill>
+              </a:rPr>
+            </a:br>
+            <a:r>
+              <a:rPr lang="en-US" sz="1200" dirty="0">
+                <a:solidFill>
+                  <a:schemeClr val="tx1"/>
+                </a:solidFill>
+              </a:rPr>
+              <a:t>Api reply  : </a:t>
+            </a:r>
+            <a:r>
+              <a:rPr lang="en-US" sz="1200" i="1" dirty="0">
+                <a:solidFill>
+                  <a:schemeClr val="tx1"/>
+                </a:solidFill>
+              </a:rPr>
+              <a:t>{ "location" : "London" , "weather" : "rainy", temperature : "17" }</a:t>
+            </a:r>
+          </a:p>
+        </p:txBody>
+      </p:sp>
+      <p:sp>
+        <p:nvSpPr>
+          <p:cNvPr id="27" name="Callout: Line with Border and Accent Bar 26">
+            <a:extLst>
+              <a:ext uri="{FF2B5EF4-FFF2-40B4-BE49-F238E27FC236}">
+                <a16:creationId xmlns:a16="http://schemas.microsoft.com/office/drawing/2014/main" id="{40FC7280-28DF-9546-F384-69DEEB8D223D}"/>
+              </a:ext>
+            </a:extLst>
+          </p:cNvPr>
+          <p:cNvSpPr/>
+          <p:nvPr/>
+        </p:nvSpPr>
+        <p:spPr>
+          <a:xfrm>
+            <a:off x="6114877" y="6188974"/>
+            <a:ext cx="1803633" cy="612648"/>
+          </a:xfrm>
+          <a:prstGeom prst="accentBorderCallout1">
+            <a:avLst>
+              <a:gd name="adj1" fmla="val 18750"/>
+              <a:gd name="adj2" fmla="val -8333"/>
+              <a:gd name="adj3" fmla="val -105218"/>
+              <a:gd name="adj4" fmla="val -129031"/>
+            </a:avLst>
+          </a:prstGeom>
+          <a:solidFill>
+            <a:schemeClr val="bg2"/>
+          </a:solidFill>
+        </p:spPr>
+        <p:style>
+          <a:lnRef idx="2">
+            <a:schemeClr val="accent1">
+              <a:shade val="15000"/>
+            </a:schemeClr>
+          </a:lnRef>
+          <a:fillRef idx="1">
+            <a:schemeClr val="accent1"/>
+          </a:fillRef>
+          <a:effectRef idx="0">
+            <a:schemeClr val="accent1"/>
+          </a:effectRef>
+          <a:fontRef idx="minor">
+            <a:schemeClr val="lt1"/>
+          </a:fontRef>
+        </p:style>
+        <p:txBody>
+          <a:bodyPr rtlCol="0" anchor="ctr"/>
+          <a:lstStyle/>
+          <a:p>
+            <a:pPr algn="ctr"/>
+            <a:r>
+              <a:rPr lang="en-US" sz="1200" dirty="0">
+                <a:solidFill>
+                  <a:schemeClr val="tx1"/>
+                </a:solidFill>
+              </a:rPr>
+              <a:t>A: Today in London is rainy, with a temperature of 17 degrees</a:t>
+            </a:r>
+          </a:p>
+        </p:txBody>
+      </p:sp>
+      <p:sp>
+        <p:nvSpPr>
+          <p:cNvPr id="30" name="Rectangle 29">
+            <a:extLst>
+              <a:ext uri="{FF2B5EF4-FFF2-40B4-BE49-F238E27FC236}">
+                <a16:creationId xmlns:a16="http://schemas.microsoft.com/office/drawing/2014/main" id="{35036F75-CCD5-76D5-1F0A-859A189B45E5}"/>
+              </a:ext>
+            </a:extLst>
+          </p:cNvPr>
+          <p:cNvSpPr/>
+          <p:nvPr/>
+        </p:nvSpPr>
+        <p:spPr>
+          <a:xfrm>
+            <a:off x="153099" y="1489350"/>
+            <a:ext cx="67112" cy="4684945"/>
+          </a:xfrm>
+          <a:prstGeom prst="rect">
+            <a:avLst/>
+          </a:prstGeom>
+        </p:spPr>
+        <p:style>
+          <a:lnRef idx="2">
+            <a:schemeClr val="accent1">
+              <a:shade val="15000"/>
+            </a:schemeClr>
+          </a:lnRef>
+          <a:fillRef idx="1">
+            <a:schemeClr val="accent1"/>
+          </a:fillRef>
+          <a:effectRef idx="0">
+            <a:schemeClr val="accent1"/>
+          </a:effectRef>
+          <a:fontRef idx="minor">
+            <a:schemeClr val="lt1"/>
+          </a:fontRef>
+        </p:style>
+        <p:txBody>
+          <a:bodyPr rtlCol="0" anchor="ctr"/>
+          <a:lstStyle/>
+          <a:p>
+            <a:pPr algn="ctr"/>
+            <a:endParaRPr lang="en-US"/>
+          </a:p>
+        </p:txBody>
+      </p:sp>
+      <p:sp>
+        <p:nvSpPr>
+          <p:cNvPr id="35" name="TextBox 34">
+            <a:extLst>
+              <a:ext uri="{FF2B5EF4-FFF2-40B4-BE49-F238E27FC236}">
+                <a16:creationId xmlns:a16="http://schemas.microsoft.com/office/drawing/2014/main" id="{454E9031-3650-1263-FD43-B9A8323B9F60}"/>
+              </a:ext>
+            </a:extLst>
+          </p:cNvPr>
+          <p:cNvSpPr txBox="1"/>
+          <p:nvPr/>
+        </p:nvSpPr>
+        <p:spPr>
+          <a:xfrm>
+            <a:off x="39004" y="1023047"/>
+            <a:ext cx="1021433" cy="369332"/>
+          </a:xfrm>
+          <a:prstGeom prst="rect">
+            <a:avLst/>
+          </a:prstGeom>
+          <a:solidFill>
+            <a:schemeClr val="accent6">
+              <a:lumMod val="20000"/>
+              <a:lumOff val="80000"/>
+            </a:schemeClr>
+          </a:solidFill>
+        </p:spPr>
+        <p:txBody>
+          <a:bodyPr wrap="none" rtlCol="0">
+            <a:spAutoFit/>
+          </a:bodyPr>
           <a:lstStyle/>
           <a:p>
             <a:r>
               <a:rPr lang="en-US" dirty="0"/>
-              <a:t>Api design for function calling</a:t>
-            </a:r>
-          </a:p>
-        </p:txBody>
-      </p:sp>
-      <p:sp>
-        <p:nvSpPr>
-          <p:cNvPr id="3" name="Content Placeholder 2">
-            <a:extLst>
-              <a:ext uri="{FF2B5EF4-FFF2-40B4-BE49-F238E27FC236}">
-                <a16:creationId xmlns:a16="http://schemas.microsoft.com/office/drawing/2014/main" id="{2F435063-D202-BDFA-876B-EF1DA0371544}"/>
-              </a:ext>
-            </a:extLst>
-          </p:cNvPr>
-          <p:cNvSpPr>
-            <a:spLocks noGrp="1"/>
-          </p:cNvSpPr>
-          <p:nvPr>
-            <p:ph idx="1"/>
-          </p:nvPr>
-        </p:nvSpPr>
-        <p:spPr/>
-        <p:txBody>
-          <a:bodyPr/>
-          <a:lstStyle/>
+              <a:t>end-user</a:t>
+            </a:r>
+          </a:p>
+        </p:txBody>
+      </p:sp>
+      <p:sp>
+        <p:nvSpPr>
+          <p:cNvPr id="43" name="TextBox 42">
+            <a:extLst>
+              <a:ext uri="{FF2B5EF4-FFF2-40B4-BE49-F238E27FC236}">
+                <a16:creationId xmlns:a16="http://schemas.microsoft.com/office/drawing/2014/main" id="{7D988E6C-B0B4-AF30-2B35-B997AA4C4789}"/>
+              </a:ext>
+            </a:extLst>
+          </p:cNvPr>
+          <p:cNvSpPr txBox="1"/>
+          <p:nvPr/>
+        </p:nvSpPr>
+        <p:spPr>
+          <a:xfrm>
+            <a:off x="1735401" y="967423"/>
+            <a:ext cx="1070037" cy="369332"/>
+          </a:xfrm>
+          <a:prstGeom prst="rect">
+            <a:avLst/>
+          </a:prstGeom>
+          <a:solidFill>
+            <a:schemeClr val="accent6">
+              <a:lumMod val="20000"/>
+              <a:lumOff val="80000"/>
+            </a:schemeClr>
+          </a:solidFill>
+        </p:spPr>
+        <p:txBody>
+          <a:bodyPr wrap="none" rtlCol="0">
+            <a:spAutoFit/>
+          </a:bodyPr>
+          <a:lstStyle>
+            <a:defPPr>
+              <a:defRPr lang="en-US"/>
+            </a:defPPr>
+            <a:lvl1pPr>
+              <a:defRPr/>
+            </a:lvl1pPr>
+          </a:lstStyle>
           <a:p>
             <a:r>
               <a:rPr lang="en-US" dirty="0"/>
-              <a:t>The Json schema syntax (to be provided as function) is the same used to define input – output </a:t>
+              <a:t>your app </a:t>
+            </a:r>
+          </a:p>
+        </p:txBody>
+      </p:sp>
+      <p:sp>
+        <p:nvSpPr>
+          <p:cNvPr id="44" name="TextBox 43">
+            <a:extLst>
+              <a:ext uri="{FF2B5EF4-FFF2-40B4-BE49-F238E27FC236}">
+                <a16:creationId xmlns:a16="http://schemas.microsoft.com/office/drawing/2014/main" id="{BA9D93CF-381A-C7C0-5DD8-F87081CBBA11}"/>
+              </a:ext>
+            </a:extLst>
+          </p:cNvPr>
+          <p:cNvSpPr txBox="1"/>
+          <p:nvPr/>
+        </p:nvSpPr>
+        <p:spPr>
+          <a:xfrm>
+            <a:off x="5198157" y="951345"/>
+            <a:ext cx="966996" cy="369332"/>
+          </a:xfrm>
+          <a:prstGeom prst="rect">
+            <a:avLst/>
+          </a:prstGeom>
+          <a:solidFill>
+            <a:schemeClr val="accent6">
+              <a:lumMod val="20000"/>
+              <a:lumOff val="80000"/>
+            </a:schemeClr>
+          </a:solidFill>
+        </p:spPr>
+        <p:txBody>
+          <a:bodyPr wrap="none" rtlCol="0">
+            <a:spAutoFit/>
+          </a:bodyPr>
+          <a:lstStyle>
+            <a:defPPr>
+              <a:defRPr lang="en-US"/>
+            </a:defPPr>
+            <a:lvl1pPr>
+              <a:defRPr/>
+            </a:lvl1pPr>
+          </a:lstStyle>
+          <a:p>
+            <a:r>
+              <a:rPr lang="en-US" dirty="0"/>
+              <a:t>chat-</a:t>
             </a:r>
             <a:r>
               <a:rPr lang="en-US" dirty="0" err="1"/>
-              <a:t>dto</a:t>
-            </a:r>
+              <a:t>gpt</a:t>
+            </a:r>
+            <a:endParaRPr lang="en-US" dirty="0"/>
+          </a:p>
+        </p:txBody>
+      </p:sp>
+      <p:sp>
+        <p:nvSpPr>
+          <p:cNvPr id="45" name="TextBox 44">
+            <a:extLst>
+              <a:ext uri="{FF2B5EF4-FFF2-40B4-BE49-F238E27FC236}">
+                <a16:creationId xmlns:a16="http://schemas.microsoft.com/office/drawing/2014/main" id="{3A1A78FE-E643-6162-5CF6-262D45E87FF7}"/>
+              </a:ext>
+            </a:extLst>
+          </p:cNvPr>
+          <p:cNvSpPr txBox="1"/>
+          <p:nvPr/>
+        </p:nvSpPr>
+        <p:spPr>
+          <a:xfrm>
+            <a:off x="9961299" y="951345"/>
+            <a:ext cx="1835311" cy="369332"/>
+          </a:xfrm>
+          <a:prstGeom prst="rect">
+            <a:avLst/>
+          </a:prstGeom>
+          <a:solidFill>
+            <a:schemeClr val="accent6">
+              <a:lumMod val="20000"/>
+              <a:lumOff val="80000"/>
+            </a:schemeClr>
+          </a:solidFill>
+        </p:spPr>
+        <p:txBody>
+          <a:bodyPr wrap="none" rtlCol="0">
+            <a:spAutoFit/>
+          </a:bodyPr>
+          <a:lstStyle>
+            <a:defPPr>
+              <a:defRPr lang="en-US"/>
+            </a:defPPr>
+            <a:lvl1pPr>
+              <a:defRPr/>
+            </a:lvl1pPr>
+          </a:lstStyle>
+          <a:p>
             <a:r>
               <a:rPr lang="en-US" dirty="0"/>
-              <a:t> in an open-api document (swagger)</a:t>
-            </a:r>
-          </a:p>
-          <a:p>
-            <a:pPr lvl="1"/>
-            <a:r>
-              <a:rPr lang="en-US" dirty="0"/>
-              <a:t>Extract dynamically from the open api document of your target api</a:t>
-            </a:r>
-          </a:p>
-          <a:p>
-            <a:pPr lvl="1"/>
-            <a:r>
-              <a:rPr lang="en-US" dirty="0"/>
-              <a:t>Put clear description on input </a:t>
-            </a:r>
-            <a:r>
-              <a:rPr lang="en-US" dirty="0" err="1"/>
-              <a:t>Dto</a:t>
-            </a:r>
-            <a:r>
-              <a:rPr lang="en-US" dirty="0"/>
-              <a:t> and its properties (</a:t>
-            </a:r>
-            <a:r>
-              <a:rPr lang="en-US" b="1" dirty="0"/>
-              <a:t>prompt engineer applied on a swagger doc </a:t>
-            </a:r>
-            <a:r>
-              <a:rPr lang="en-US" b="1" dirty="0">
-                <a:sym typeface="Wingdings" panose="05000000000000000000" pitchFamily="2" charset="2"/>
-              </a:rPr>
-              <a:t></a:t>
-            </a:r>
-            <a:r>
-              <a:rPr lang="en-US" dirty="0">
-                <a:sym typeface="Wingdings" panose="05000000000000000000" pitchFamily="2" charset="2"/>
-              </a:rPr>
-              <a:t>)</a:t>
-            </a:r>
-          </a:p>
-          <a:p>
-            <a:pPr lvl="1"/>
-            <a:r>
-              <a:rPr lang="en-US" dirty="0">
-                <a:sym typeface="Wingdings" panose="05000000000000000000" pitchFamily="2" charset="2"/>
-              </a:rPr>
-              <a:t>Document </a:t>
-            </a:r>
-            <a:r>
-              <a:rPr lang="en-US" b="1" dirty="0">
-                <a:sym typeface="Wingdings" panose="05000000000000000000" pitchFamily="2" charset="2"/>
-              </a:rPr>
-              <a:t>required</a:t>
-            </a:r>
-            <a:r>
-              <a:rPr lang="en-US" dirty="0">
-                <a:sym typeface="Wingdings" panose="05000000000000000000" pitchFamily="2" charset="2"/>
-              </a:rPr>
-              <a:t> properties </a:t>
-            </a:r>
-          </a:p>
-          <a:p>
-            <a:pPr lvl="1"/>
-            <a:r>
-              <a:rPr lang="en-US" dirty="0">
-                <a:sym typeface="Wingdings" panose="05000000000000000000" pitchFamily="2" charset="2"/>
-              </a:rPr>
-              <a:t>Make sure </a:t>
-            </a:r>
-            <a:r>
-              <a:rPr lang="en-US" dirty="0" err="1">
-                <a:sym typeface="Wingdings" panose="05000000000000000000" pitchFamily="2" charset="2"/>
-              </a:rPr>
-              <a:t>enums</a:t>
-            </a:r>
-            <a:r>
-              <a:rPr lang="en-US" dirty="0">
-                <a:sym typeface="Wingdings" panose="05000000000000000000" pitchFamily="2" charset="2"/>
-              </a:rPr>
-              <a:t> are exposed in the swagger doc as strings</a:t>
-            </a:r>
-          </a:p>
-          <a:p>
-            <a:pPr lvl="1"/>
-            <a:r>
-              <a:rPr lang="en-US" dirty="0">
-                <a:sym typeface="Wingdings" panose="05000000000000000000" pitchFamily="2" charset="2"/>
-              </a:rPr>
-              <a:t>Make sure </a:t>
-            </a:r>
-            <a:r>
-              <a:rPr lang="en-US" dirty="0" err="1">
-                <a:sym typeface="Wingdings" panose="05000000000000000000" pitchFamily="2" charset="2"/>
-              </a:rPr>
-              <a:t>enums</a:t>
-            </a:r>
-            <a:r>
-              <a:rPr lang="en-US" dirty="0">
-                <a:sym typeface="Wingdings" panose="05000000000000000000" pitchFamily="2" charset="2"/>
-              </a:rPr>
-              <a:t> as strings are accepted as input at run time</a:t>
-            </a:r>
-          </a:p>
-          <a:p>
-            <a:pPr lvl="2"/>
-            <a:endParaRPr lang="en-US" dirty="0">
-              <a:sym typeface="Wingdings" panose="05000000000000000000" pitchFamily="2" charset="2"/>
-            </a:endParaRPr>
-          </a:p>
-          <a:p>
-            <a:pPr lvl="1"/>
-            <a:endParaRPr lang="en-US" dirty="0"/>
+              <a:t>your weather api </a:t>
+            </a:r>
           </a:p>
         </p:txBody>
       </p:sp>
     </p:spTree>
     <p:extLst>
       <p:ext uri="{BB962C8B-B14F-4D97-AF65-F5344CB8AC3E}">
-        <p14:creationId xmlns:p14="http://schemas.microsoft.com/office/powerpoint/2010/main" val="803272294"/>
+        <p14:creationId xmlns:p14="http://schemas.microsoft.com/office/powerpoint/2010/main" val="311172512"/>
       </p:ext>
     </p:extLst>
   </p:cSld>
   <p:clrMapOvr>
     <a:masterClrMapping/>
   </p:clrMapOvr>
+  <p:timing>
+    <p:tnLst>
+      <p:par>
+        <p:cTn id="1" dur="indefinite" restart="never" nodeType="tmRoot">
+          <p:childTnLst>
+            <p:seq concurrent="1" nextAc="seek">
+              <p:cTn id="2" dur="indefinite" nodeType="mainSeq">
+                <p:childTnLst>
+                  <p:par>
+                    <p:cTn id="3" fill="hold">
+                      <p:stCondLst>
+                        <p:cond delay="indefinite"/>
+                      </p:stCondLst>
+                      <p:childTnLst>
+                        <p:par>
+                          <p:cTn id="4" fill="hold">
+                            <p:stCondLst>
+                              <p:cond delay="0"/>
+                            </p:stCondLst>
+                            <p:childTnLst>
+                              <p:par>
+                                <p:cTn id="5" presetID="1" presetClass="entr" presetSubtype="0" fill="hold" grpId="0" nodeType="clickEffect">
+                                  <p:stCondLst>
+                                    <p:cond delay="0"/>
+                                  </p:stCondLst>
+                                  <p:childTnLst>
+                                    <p:set>
+                                      <p:cBhvr>
+                                        <p:cTn id="6" dur="1" fill="hold">
+                                          <p:stCondLst>
+                                            <p:cond delay="0"/>
+                                          </p:stCondLst>
+                                        </p:cTn>
+                                        <p:tgtEl>
+                                          <p:spTgt spid="20"/>
+                                        </p:tgtEl>
+                                        <p:attrNameLst>
+                                          <p:attrName>style.visibility</p:attrName>
+                                        </p:attrNameLst>
+                                      </p:cBhvr>
+                                      <p:to>
+                                        <p:strVal val="visible"/>
+                                      </p:to>
+                                    </p:set>
+                                  </p:childTnLst>
+                                </p:cTn>
+                              </p:par>
+                              <p:par>
+                                <p:cTn id="7" presetID="1" presetClass="entr" presetSubtype="0" fill="hold" nodeType="withEffect">
+                                  <p:stCondLst>
+                                    <p:cond delay="0"/>
+                                  </p:stCondLst>
+                                  <p:childTnLst>
+                                    <p:set>
+                                      <p:cBhvr>
+                                        <p:cTn id="8" dur="1" fill="hold">
+                                          <p:stCondLst>
+                                            <p:cond delay="0"/>
+                                          </p:stCondLst>
+                                        </p:cTn>
+                                        <p:tgtEl>
+                                          <p:spTgt spid="8"/>
+                                        </p:tgtEl>
+                                        <p:attrNameLst>
+                                          <p:attrName>style.visibility</p:attrName>
+                                        </p:attrNameLst>
+                                      </p:cBhvr>
+                                      <p:to>
+                                        <p:strVal val="visible"/>
+                                      </p:to>
+                                    </p:set>
+                                  </p:childTnLst>
+                                </p:cTn>
+                              </p:par>
+                            </p:childTnLst>
+                          </p:cTn>
+                        </p:par>
+                      </p:childTnLst>
+                    </p:cTn>
+                  </p:par>
+                  <p:par>
+                    <p:cTn id="9" fill="hold">
+                      <p:stCondLst>
+                        <p:cond delay="indefinite"/>
+                      </p:stCondLst>
+                      <p:childTnLst>
+                        <p:par>
+                          <p:cTn id="10" fill="hold">
+                            <p:stCondLst>
+                              <p:cond delay="0"/>
+                            </p:stCondLst>
+                            <p:childTnLst>
+                              <p:par>
+                                <p:cTn id="11" presetID="1" presetClass="entr" presetSubtype="0" fill="hold" nodeType="clickEffect">
+                                  <p:stCondLst>
+                                    <p:cond delay="0"/>
+                                  </p:stCondLst>
+                                  <p:childTnLst>
+                                    <p:set>
+                                      <p:cBhvr>
+                                        <p:cTn id="12" dur="1" fill="hold">
+                                          <p:stCondLst>
+                                            <p:cond delay="0"/>
+                                          </p:stCondLst>
+                                        </p:cTn>
+                                        <p:tgtEl>
+                                          <p:spTgt spid="9"/>
+                                        </p:tgtEl>
+                                        <p:attrNameLst>
+                                          <p:attrName>style.visibility</p:attrName>
+                                        </p:attrNameLst>
+                                      </p:cBhvr>
+                                      <p:to>
+                                        <p:strVal val="visible"/>
+                                      </p:to>
+                                    </p:set>
+                                  </p:childTnLst>
+                                </p:cTn>
+                              </p:par>
+                              <p:par>
+                                <p:cTn id="13" presetID="1" presetClass="entr" presetSubtype="0" fill="hold" grpId="0" nodeType="withEffect">
+                                  <p:stCondLst>
+                                    <p:cond delay="0"/>
+                                  </p:stCondLst>
+                                  <p:childTnLst>
+                                    <p:set>
+                                      <p:cBhvr>
+                                        <p:cTn id="14" dur="1" fill="hold">
+                                          <p:stCondLst>
+                                            <p:cond delay="0"/>
+                                          </p:stCondLst>
+                                        </p:cTn>
+                                        <p:tgtEl>
+                                          <p:spTgt spid="22"/>
+                                        </p:tgtEl>
+                                        <p:attrNameLst>
+                                          <p:attrName>style.visibility</p:attrName>
+                                        </p:attrNameLst>
+                                      </p:cBhvr>
+                                      <p:to>
+                                        <p:strVal val="visible"/>
+                                      </p:to>
+                                    </p:set>
+                                  </p:childTnLst>
+                                </p:cTn>
+                              </p:par>
+                            </p:childTnLst>
+                          </p:cTn>
+                        </p:par>
+                      </p:childTnLst>
+                    </p:cTn>
+                  </p:par>
+                  <p:par>
+                    <p:cTn id="15" fill="hold">
+                      <p:stCondLst>
+                        <p:cond delay="indefinite"/>
+                      </p:stCondLst>
+                      <p:childTnLst>
+                        <p:par>
+                          <p:cTn id="16" fill="hold">
+                            <p:stCondLst>
+                              <p:cond delay="0"/>
+                            </p:stCondLst>
+                            <p:childTnLst>
+                              <p:par>
+                                <p:cTn id="17" presetID="1" presetClass="entr" presetSubtype="0" fill="hold" nodeType="clickEffect">
+                                  <p:stCondLst>
+                                    <p:cond delay="0"/>
+                                  </p:stCondLst>
+                                  <p:childTnLst>
+                                    <p:set>
+                                      <p:cBhvr>
+                                        <p:cTn id="18" dur="1" fill="hold">
+                                          <p:stCondLst>
+                                            <p:cond delay="0"/>
+                                          </p:stCondLst>
+                                        </p:cTn>
+                                        <p:tgtEl>
+                                          <p:spTgt spid="12"/>
+                                        </p:tgtEl>
+                                        <p:attrNameLst>
+                                          <p:attrName>style.visibility</p:attrName>
+                                        </p:attrNameLst>
+                                      </p:cBhvr>
+                                      <p:to>
+                                        <p:strVal val="visible"/>
+                                      </p:to>
+                                    </p:set>
+                                  </p:childTnLst>
+                                </p:cTn>
+                              </p:par>
+                              <p:par>
+                                <p:cTn id="19" presetID="1" presetClass="entr" presetSubtype="0" fill="hold" grpId="0" nodeType="withEffect">
+                                  <p:stCondLst>
+                                    <p:cond delay="0"/>
+                                  </p:stCondLst>
+                                  <p:childTnLst>
+                                    <p:set>
+                                      <p:cBhvr>
+                                        <p:cTn id="20" dur="1" fill="hold">
+                                          <p:stCondLst>
+                                            <p:cond delay="0"/>
+                                          </p:stCondLst>
+                                        </p:cTn>
+                                        <p:tgtEl>
+                                          <p:spTgt spid="21"/>
+                                        </p:tgtEl>
+                                        <p:attrNameLst>
+                                          <p:attrName>style.visibility</p:attrName>
+                                        </p:attrNameLst>
+                                      </p:cBhvr>
+                                      <p:to>
+                                        <p:strVal val="visible"/>
+                                      </p:to>
+                                    </p:set>
+                                  </p:childTnLst>
+                                </p:cTn>
+                              </p:par>
+                            </p:childTnLst>
+                          </p:cTn>
+                        </p:par>
+                      </p:childTnLst>
+                    </p:cTn>
+                  </p:par>
+                  <p:par>
+                    <p:cTn id="21" fill="hold">
+                      <p:stCondLst>
+                        <p:cond delay="indefinite"/>
+                      </p:stCondLst>
+                      <p:childTnLst>
+                        <p:par>
+                          <p:cTn id="22" fill="hold">
+                            <p:stCondLst>
+                              <p:cond delay="0"/>
+                            </p:stCondLst>
+                            <p:childTnLst>
+                              <p:par>
+                                <p:cTn id="23" presetID="1" presetClass="entr" presetSubtype="0" fill="hold" nodeType="clickEffect">
+                                  <p:stCondLst>
+                                    <p:cond delay="0"/>
+                                  </p:stCondLst>
+                                  <p:childTnLst>
+                                    <p:set>
+                                      <p:cBhvr>
+                                        <p:cTn id="24" dur="1" fill="hold">
+                                          <p:stCondLst>
+                                            <p:cond delay="0"/>
+                                          </p:stCondLst>
+                                        </p:cTn>
+                                        <p:tgtEl>
+                                          <p:spTgt spid="13"/>
+                                        </p:tgtEl>
+                                        <p:attrNameLst>
+                                          <p:attrName>style.visibility</p:attrName>
+                                        </p:attrNameLst>
+                                      </p:cBhvr>
+                                      <p:to>
+                                        <p:strVal val="visible"/>
+                                      </p:to>
+                                    </p:set>
+                                  </p:childTnLst>
+                                </p:cTn>
+                              </p:par>
+                              <p:par>
+                                <p:cTn id="25" presetID="1" presetClass="entr" presetSubtype="0" fill="hold" grpId="0" nodeType="withEffect">
+                                  <p:stCondLst>
+                                    <p:cond delay="0"/>
+                                  </p:stCondLst>
+                                  <p:childTnLst>
+                                    <p:set>
+                                      <p:cBhvr>
+                                        <p:cTn id="26" dur="1" fill="hold">
+                                          <p:stCondLst>
+                                            <p:cond delay="0"/>
+                                          </p:stCondLst>
+                                        </p:cTn>
+                                        <p:tgtEl>
+                                          <p:spTgt spid="23"/>
+                                        </p:tgtEl>
+                                        <p:attrNameLst>
+                                          <p:attrName>style.visibility</p:attrName>
+                                        </p:attrNameLst>
+                                      </p:cBhvr>
+                                      <p:to>
+                                        <p:strVal val="visible"/>
+                                      </p:to>
+                                    </p:set>
+                                  </p:childTnLst>
+                                </p:cTn>
+                              </p:par>
+                            </p:childTnLst>
+                          </p:cTn>
+                        </p:par>
+                      </p:childTnLst>
+                    </p:cTn>
+                  </p:par>
+                  <p:par>
+                    <p:cTn id="27" fill="hold">
+                      <p:stCondLst>
+                        <p:cond delay="indefinite"/>
+                      </p:stCondLst>
+                      <p:childTnLst>
+                        <p:par>
+                          <p:cTn id="28" fill="hold">
+                            <p:stCondLst>
+                              <p:cond delay="0"/>
+                            </p:stCondLst>
+                            <p:childTnLst>
+                              <p:par>
+                                <p:cTn id="29" presetID="1" presetClass="entr" presetSubtype="0" fill="hold" nodeType="clickEffect">
+                                  <p:stCondLst>
+                                    <p:cond delay="0"/>
+                                  </p:stCondLst>
+                                  <p:childTnLst>
+                                    <p:set>
+                                      <p:cBhvr>
+                                        <p:cTn id="30" dur="1" fill="hold">
+                                          <p:stCondLst>
+                                            <p:cond delay="0"/>
+                                          </p:stCondLst>
+                                        </p:cTn>
+                                        <p:tgtEl>
+                                          <p:spTgt spid="14"/>
+                                        </p:tgtEl>
+                                        <p:attrNameLst>
+                                          <p:attrName>style.visibility</p:attrName>
+                                        </p:attrNameLst>
+                                      </p:cBhvr>
+                                      <p:to>
+                                        <p:strVal val="visible"/>
+                                      </p:to>
+                                    </p:set>
+                                  </p:childTnLst>
+                                </p:cTn>
+                              </p:par>
+                              <p:par>
+                                <p:cTn id="31" presetID="1" presetClass="entr" presetSubtype="0" fill="hold" grpId="0" nodeType="withEffect">
+                                  <p:stCondLst>
+                                    <p:cond delay="0"/>
+                                  </p:stCondLst>
+                                  <p:childTnLst>
+                                    <p:set>
+                                      <p:cBhvr>
+                                        <p:cTn id="32" dur="1" fill="hold">
+                                          <p:stCondLst>
+                                            <p:cond delay="0"/>
+                                          </p:stCondLst>
+                                        </p:cTn>
+                                        <p:tgtEl>
+                                          <p:spTgt spid="24"/>
+                                        </p:tgtEl>
+                                        <p:attrNameLst>
+                                          <p:attrName>style.visibility</p:attrName>
+                                        </p:attrNameLst>
+                                      </p:cBhvr>
+                                      <p:to>
+                                        <p:strVal val="visible"/>
+                                      </p:to>
+                                    </p:set>
+                                  </p:childTnLst>
+                                </p:cTn>
+                              </p:par>
+                              <p:par>
+                                <p:cTn id="33" presetID="1" presetClass="entr" presetSubtype="0" fill="hold" nodeType="withEffect">
+                                  <p:stCondLst>
+                                    <p:cond delay="0"/>
+                                  </p:stCondLst>
+                                  <p:childTnLst>
+                                    <p:set>
+                                      <p:cBhvr>
+                                        <p:cTn id="34" dur="1" fill="hold">
+                                          <p:stCondLst>
+                                            <p:cond delay="0"/>
+                                          </p:stCondLst>
+                                        </p:cTn>
+                                        <p:tgtEl>
+                                          <p:spTgt spid="18"/>
+                                        </p:tgtEl>
+                                        <p:attrNameLst>
+                                          <p:attrName>style.visibility</p:attrName>
+                                        </p:attrNameLst>
+                                      </p:cBhvr>
+                                      <p:to>
+                                        <p:strVal val="visible"/>
+                                      </p:to>
+                                    </p:set>
+                                  </p:childTnLst>
+                                </p:cTn>
+                              </p:par>
+                              <p:par>
+                                <p:cTn id="35" presetID="1" presetClass="entr" presetSubtype="0" fill="hold" grpId="0" nodeType="withEffect">
+                                  <p:stCondLst>
+                                    <p:cond delay="0"/>
+                                  </p:stCondLst>
+                                  <p:childTnLst>
+                                    <p:set>
+                                      <p:cBhvr>
+                                        <p:cTn id="36" dur="1" fill="hold">
+                                          <p:stCondLst>
+                                            <p:cond delay="0"/>
+                                          </p:stCondLst>
+                                        </p:cTn>
+                                        <p:tgtEl>
+                                          <p:spTgt spid="25"/>
+                                        </p:tgtEl>
+                                        <p:attrNameLst>
+                                          <p:attrName>style.visibility</p:attrName>
+                                        </p:attrNameLst>
+                                      </p:cBhvr>
+                                      <p:to>
+                                        <p:strVal val="visible"/>
+                                      </p:to>
+                                    </p:set>
+                                  </p:childTnLst>
+                                </p:cTn>
+                              </p:par>
+                            </p:childTnLst>
+                          </p:cTn>
+                        </p:par>
+                      </p:childTnLst>
+                    </p:cTn>
+                  </p:par>
+                  <p:par>
+                    <p:cTn id="37" fill="hold">
+                      <p:stCondLst>
+                        <p:cond delay="indefinite"/>
+                      </p:stCondLst>
+                      <p:childTnLst>
+                        <p:par>
+                          <p:cTn id="38" fill="hold">
+                            <p:stCondLst>
+                              <p:cond delay="0"/>
+                            </p:stCondLst>
+                            <p:childTnLst>
+                              <p:par>
+                                <p:cTn id="39" presetID="1" presetClass="entr" presetSubtype="0" fill="hold" nodeType="clickEffect">
+                                  <p:stCondLst>
+                                    <p:cond delay="0"/>
+                                  </p:stCondLst>
+                                  <p:childTnLst>
+                                    <p:set>
+                                      <p:cBhvr>
+                                        <p:cTn id="40" dur="1" fill="hold">
+                                          <p:stCondLst>
+                                            <p:cond delay="0"/>
+                                          </p:stCondLst>
+                                        </p:cTn>
+                                        <p:tgtEl>
+                                          <p:spTgt spid="16"/>
+                                        </p:tgtEl>
+                                        <p:attrNameLst>
+                                          <p:attrName>style.visibility</p:attrName>
+                                        </p:attrNameLst>
+                                      </p:cBhvr>
+                                      <p:to>
+                                        <p:strVal val="visible"/>
+                                      </p:to>
+                                    </p:set>
+                                  </p:childTnLst>
+                                </p:cTn>
+                              </p:par>
+                              <p:par>
+                                <p:cTn id="41" presetID="1" presetClass="entr" presetSubtype="0" fill="hold" grpId="0" nodeType="withEffect">
+                                  <p:stCondLst>
+                                    <p:cond delay="0"/>
+                                  </p:stCondLst>
+                                  <p:childTnLst>
+                                    <p:set>
+                                      <p:cBhvr>
+                                        <p:cTn id="42" dur="1" fill="hold">
+                                          <p:stCondLst>
+                                            <p:cond delay="0"/>
+                                          </p:stCondLst>
+                                        </p:cTn>
+                                        <p:tgtEl>
+                                          <p:spTgt spid="26"/>
+                                        </p:tgtEl>
+                                        <p:attrNameLst>
+                                          <p:attrName>style.visibility</p:attrName>
+                                        </p:attrNameLst>
+                                      </p:cBhvr>
+                                      <p:to>
+                                        <p:strVal val="visible"/>
+                                      </p:to>
+                                    </p:set>
+                                  </p:childTnLst>
+                                </p:cTn>
+                              </p:par>
+                            </p:childTnLst>
+                          </p:cTn>
+                        </p:par>
+                      </p:childTnLst>
+                    </p:cTn>
+                  </p:par>
+                  <p:par>
+                    <p:cTn id="43" fill="hold">
+                      <p:stCondLst>
+                        <p:cond delay="indefinite"/>
+                      </p:stCondLst>
+                      <p:childTnLst>
+                        <p:par>
+                          <p:cTn id="44" fill="hold">
+                            <p:stCondLst>
+                              <p:cond delay="0"/>
+                            </p:stCondLst>
+                            <p:childTnLst>
+                              <p:par>
+                                <p:cTn id="45" presetID="1" presetClass="entr" presetSubtype="0" fill="hold" nodeType="clickEffect">
+                                  <p:stCondLst>
+                                    <p:cond delay="0"/>
+                                  </p:stCondLst>
+                                  <p:childTnLst>
+                                    <p:set>
+                                      <p:cBhvr>
+                                        <p:cTn id="46" dur="1" fill="hold">
+                                          <p:stCondLst>
+                                            <p:cond delay="0"/>
+                                          </p:stCondLst>
+                                        </p:cTn>
+                                        <p:tgtEl>
+                                          <p:spTgt spid="17"/>
+                                        </p:tgtEl>
+                                        <p:attrNameLst>
+                                          <p:attrName>style.visibility</p:attrName>
+                                        </p:attrNameLst>
+                                      </p:cBhvr>
+                                      <p:to>
+                                        <p:strVal val="visible"/>
+                                      </p:to>
+                                    </p:set>
+                                  </p:childTnLst>
+                                </p:cTn>
+                              </p:par>
+                              <p:par>
+                                <p:cTn id="47" presetID="1" presetClass="entr" presetSubtype="0" fill="hold" grpId="0" nodeType="withEffect">
+                                  <p:stCondLst>
+                                    <p:cond delay="0"/>
+                                  </p:stCondLst>
+                                  <p:childTnLst>
+                                    <p:set>
+                                      <p:cBhvr>
+                                        <p:cTn id="48" dur="1" fill="hold">
+                                          <p:stCondLst>
+                                            <p:cond delay="0"/>
+                                          </p:stCondLst>
+                                        </p:cTn>
+                                        <p:tgtEl>
+                                          <p:spTgt spid="27"/>
+                                        </p:tgtEl>
+                                        <p:attrNameLst>
+                                          <p:attrName>style.visibility</p:attrName>
+                                        </p:attrNameLst>
+                                      </p:cBhvr>
+                                      <p:to>
+                                        <p:strVal val="visible"/>
+                                      </p:to>
+                                    </p:set>
+                                  </p:childTnLst>
+                                </p:cTn>
+                              </p:par>
+                            </p:childTnLst>
+                          </p:cTn>
+                        </p:par>
+                      </p:childTnLst>
+                    </p:cTn>
+                  </p:par>
+                </p:childTnLst>
+              </p:cTn>
+              <p:prevCondLst>
+                <p:cond evt="onPrev" delay="0">
+                  <p:tgtEl>
+                    <p:sldTgt/>
+                  </p:tgtEl>
+                </p:cond>
+              </p:prevCondLst>
+              <p:nextCondLst>
+                <p:cond evt="onNext" delay="0">
+                  <p:tgtEl>
+                    <p:sldTgt/>
+                  </p:tgtEl>
+                </p:cond>
+              </p:nextCondLst>
+            </p:seq>
+          </p:childTnLst>
+        </p:cTn>
+      </p:par>
+    </p:tnLst>
+    <p:bldLst>
+      <p:bldP spid="20" grpId="0" animBg="1"/>
+      <p:bldP spid="21" grpId="0" animBg="1"/>
+      <p:bldP spid="22" grpId="0" animBg="1"/>
+      <p:bldP spid="23" grpId="0" animBg="1"/>
+      <p:bldP spid="24" grpId="0" animBg="1"/>
+      <p:bldP spid="25" grpId="0" animBg="1"/>
+      <p:bldP spid="26" grpId="0" animBg="1"/>
+      <p:bldP spid="27" grpId="0" animBg="1"/>
+    </p:bldLst>
+  </p:timing>
 </p:sld>
 </file>
 
@@ -4174,7 +6576,7 @@
           <p:cNvPr id="2" name="Title 1">
             <a:extLst>
               <a:ext uri="{FF2B5EF4-FFF2-40B4-BE49-F238E27FC236}">
-                <a16:creationId xmlns:a16="http://schemas.microsoft.com/office/drawing/2014/main" id="{472CA6C5-D301-54EC-AECC-79D1CFECC62C}"/>
+                <a16:creationId xmlns:a16="http://schemas.microsoft.com/office/drawing/2014/main" id="{EBFCB1D2-0B81-312E-ED64-DBBDE9F62224}"/>
               </a:ext>
             </a:extLst>
           </p:cNvPr>
@@ -4192,7 +6594,7 @@
           <a:p>
             <a:r>
               <a:rPr lang="en-US" dirty="0"/>
-              <a:t>Api design for function calling..  continue</a:t>
+              <a:t>Api design for function calling</a:t>
             </a:r>
           </a:p>
         </p:txBody>
@@ -4202,7 +6604,7 @@
           <p:cNvPr id="3" name="Content Placeholder 2">
             <a:extLst>
               <a:ext uri="{FF2B5EF4-FFF2-40B4-BE49-F238E27FC236}">
-                <a16:creationId xmlns:a16="http://schemas.microsoft.com/office/drawing/2014/main" id="{50582BAB-C074-1583-004B-0E400A787E29}"/>
+                <a16:creationId xmlns:a16="http://schemas.microsoft.com/office/drawing/2014/main" id="{2F435063-D202-BDFA-876B-EF1DA0371544}"/>
               </a:ext>
             </a:extLst>
           </p:cNvPr>
@@ -4215,502 +6617,131 @@
         </p:nvSpPr>
         <p:spPr/>
         <p:txBody>
-          <a:bodyPr>
-            <a:normAutofit lnSpcReduction="10000"/>
-          </a:bodyPr>
-          <a:lstStyle/>
-          <a:p>
+          <a:bodyPr/>
+          <a:lstStyle/>
+          <a:p>
+            <a:r>
+              <a:rPr lang="en-US" dirty="0"/>
+              <a:t>The Json schema syntax (to be provided as function) is the same used to define input – output </a:t>
+            </a:r>
+            <a:r>
+              <a:rPr lang="en-US" dirty="0" err="1"/>
+              <a:t>dto</a:t>
+            </a:r>
+            <a:r>
+              <a:rPr lang="en-US" dirty="0"/>
+              <a:t> in an open-api document (swagger)</a:t>
+            </a:r>
+          </a:p>
+          <a:p>
+            <a:pPr lvl="1"/>
+            <a:r>
+              <a:rPr lang="en-US" dirty="0"/>
+              <a:t>Extract dynamically from the open api document of your target api</a:t>
+            </a:r>
+          </a:p>
+          <a:p>
+            <a:pPr lvl="1"/>
+            <a:r>
+              <a:rPr lang="en-US" dirty="0"/>
+              <a:t>Put clear description on input </a:t>
+            </a:r>
+            <a:r>
+              <a:rPr lang="en-US" dirty="0" err="1"/>
+              <a:t>dto</a:t>
+            </a:r>
+            <a:r>
+              <a:rPr lang="en-US" dirty="0"/>
+              <a:t> and its properties (</a:t>
+            </a:r>
+            <a:r>
+              <a:rPr lang="en-US" b="1" dirty="0"/>
+              <a:t>prompt engineer applied on a swagger doc </a:t>
+            </a:r>
+            <a:r>
+              <a:rPr lang="en-US" b="1" dirty="0">
+                <a:sym typeface="Wingdings" panose="05000000000000000000" pitchFamily="2" charset="2"/>
+              </a:rPr>
+              <a:t></a:t>
+            </a:r>
             <a:r>
               <a:rPr lang="en-US" dirty="0">
                 <a:sym typeface="Wingdings" panose="05000000000000000000" pitchFamily="2" charset="2"/>
               </a:rPr>
-              <a:t>Validate the input with care (fluent validation)</a:t>
-            </a:r>
-          </a:p>
-          <a:p>
+              <a:t>)</a:t>
+            </a:r>
+          </a:p>
+          <a:p>
+            <a:pPr lvl="1"/>
             <a:r>
               <a:rPr lang="en-US" dirty="0">
                 <a:sym typeface="Wingdings" panose="05000000000000000000" pitchFamily="2" charset="2"/>
               </a:rPr>
-              <a:t>Return errors in Json format, stating clearly each property having problem and the action to take</a:t>
-            </a:r>
-          </a:p>
-          <a:p>
+              <a:t>Document </a:t>
+            </a:r>
+            <a:r>
+              <a:rPr lang="en-US" b="1" dirty="0">
+                <a:sym typeface="Wingdings" panose="05000000000000000000" pitchFamily="2" charset="2"/>
+              </a:rPr>
+              <a:t>required</a:t>
+            </a:r>
             <a:r>
               <a:rPr lang="en-US" dirty="0">
                 <a:sym typeface="Wingdings" panose="05000000000000000000" pitchFamily="2" charset="2"/>
               </a:rPr>
-              <a:t>Your validation code must be </a:t>
+              <a:t> properties </a:t>
+            </a:r>
+          </a:p>
+          <a:p>
+            <a:pPr lvl="1"/>
+            <a:r>
+              <a:rPr lang="en-US" dirty="0">
+                <a:sym typeface="Wingdings" panose="05000000000000000000" pitchFamily="2" charset="2"/>
+              </a:rPr>
+              <a:t>Make sure </a:t>
             </a:r>
             <a:r>
               <a:rPr lang="en-US" dirty="0" err="1">
                 <a:sym typeface="Wingdings" panose="05000000000000000000" pitchFamily="2" charset="2"/>
               </a:rPr>
-              <a:t>conversational,suggesting</a:t>
+              <a:t>enums</a:t>
             </a:r>
             <a:r>
               <a:rPr lang="en-US" dirty="0">
                 <a:sym typeface="Wingdings" panose="05000000000000000000" pitchFamily="2" charset="2"/>
               </a:rPr>
-              <a:t> action to the chatbot,  e.g. : </a:t>
-            </a:r>
-          </a:p>
-          <a:p>
-            <a:pPr marL="0" indent="0">
-              <a:buNone/>
-            </a:pPr>
-            <a:r>
-              <a:rPr lang="en-US" sz="1100" dirty="0" err="1">
-                <a:solidFill>
-                  <a:srgbClr val="000000"/>
-                </a:solidFill>
-                <a:latin typeface="Courier New" panose="02070309020205020404" pitchFamily="49" charset="0"/>
-                <a:cs typeface="Courier New" panose="02070309020205020404" pitchFamily="49" charset="0"/>
-              </a:rPr>
-              <a:t>ret.Errors.Add</a:t>
-            </a:r>
-            <a:r>
-              <a:rPr lang="en-US" sz="1100" dirty="0">
-                <a:solidFill>
-                  <a:srgbClr val="000000"/>
-                </a:solidFill>
-                <a:latin typeface="Courier New" panose="02070309020205020404" pitchFamily="49" charset="0"/>
-                <a:cs typeface="Courier New" panose="02070309020205020404" pitchFamily="49" charset="0"/>
-              </a:rPr>
-              <a:t>(</a:t>
-            </a:r>
-            <a:r>
-              <a:rPr lang="en-US" sz="1100" dirty="0">
-                <a:solidFill>
-                  <a:srgbClr val="0000FF"/>
-                </a:solidFill>
-                <a:latin typeface="Courier New" panose="02070309020205020404" pitchFamily="49" charset="0"/>
-                <a:cs typeface="Courier New" panose="02070309020205020404" pitchFamily="49" charset="0"/>
-              </a:rPr>
-              <a:t>new</a:t>
-            </a:r>
-            <a:r>
-              <a:rPr lang="en-US" sz="1100" dirty="0">
-                <a:solidFill>
-                  <a:srgbClr val="000000"/>
-                </a:solidFill>
-                <a:latin typeface="Courier New" panose="02070309020205020404" pitchFamily="49" charset="0"/>
-                <a:cs typeface="Courier New" panose="02070309020205020404" pitchFamily="49" charset="0"/>
-              </a:rPr>
-              <a:t> </a:t>
-            </a:r>
-            <a:r>
-              <a:rPr lang="en-US" sz="1100" dirty="0" err="1">
-                <a:solidFill>
-                  <a:srgbClr val="000000"/>
-                </a:solidFill>
-                <a:latin typeface="Courier New" panose="02070309020205020404" pitchFamily="49" charset="0"/>
-                <a:cs typeface="Courier New" panose="02070309020205020404" pitchFamily="49" charset="0"/>
-              </a:rPr>
-              <a:t>ValidationFailure</a:t>
-            </a:r>
-            <a:r>
-              <a:rPr lang="en-US" sz="1100" dirty="0">
-                <a:solidFill>
-                  <a:srgbClr val="000000"/>
-                </a:solidFill>
-                <a:latin typeface="Courier New" panose="02070309020205020404" pitchFamily="49" charset="0"/>
-                <a:cs typeface="Courier New" panose="02070309020205020404" pitchFamily="49" charset="0"/>
-              </a:rPr>
-              <a:t>(</a:t>
-            </a:r>
-            <a:r>
-              <a:rPr lang="en-US" sz="1100" dirty="0" err="1">
-                <a:solidFill>
-                  <a:srgbClr val="000000"/>
-                </a:solidFill>
-                <a:latin typeface="Courier New" panose="02070309020205020404" pitchFamily="49" charset="0"/>
-                <a:cs typeface="Courier New" panose="02070309020205020404" pitchFamily="49" charset="0"/>
-              </a:rPr>
-              <a:t>propertyName</a:t>
-            </a:r>
-            <a:r>
-              <a:rPr lang="en-US" sz="1100" dirty="0">
-                <a:solidFill>
-                  <a:srgbClr val="000000"/>
-                </a:solidFill>
-                <a:latin typeface="Courier New" panose="02070309020205020404" pitchFamily="49" charset="0"/>
-                <a:cs typeface="Courier New" panose="02070309020205020404" pitchFamily="49" charset="0"/>
-              </a:rPr>
-              <a:t>,</a:t>
-            </a:r>
-          </a:p>
-          <a:p>
-            <a:pPr marL="0" indent="0">
-              <a:buNone/>
-            </a:pPr>
-            <a:r>
-              <a:rPr lang="en-US" sz="1100" dirty="0">
-                <a:solidFill>
-                  <a:srgbClr val="000000"/>
-                </a:solidFill>
-                <a:latin typeface="Courier New" panose="02070309020205020404" pitchFamily="49" charset="0"/>
-                <a:cs typeface="Courier New" panose="02070309020205020404" pitchFamily="49" charset="0"/>
-              </a:rPr>
-              <a:t>     (</a:t>
-            </a:r>
-            <a:r>
-              <a:rPr lang="en-US" sz="1100" dirty="0">
-                <a:solidFill>
-                  <a:srgbClr val="0000FF"/>
-                </a:solidFill>
-                <a:latin typeface="Courier New" panose="02070309020205020404" pitchFamily="49" charset="0"/>
-                <a:cs typeface="Courier New" panose="02070309020205020404" pitchFamily="49" charset="0"/>
-              </a:rPr>
-              <a:t>new</a:t>
-            </a:r>
-            <a:r>
-              <a:rPr lang="en-US" sz="1100" dirty="0">
-                <a:solidFill>
-                  <a:srgbClr val="000000"/>
-                </a:solidFill>
-                <a:latin typeface="Courier New" panose="02070309020205020404" pitchFamily="49" charset="0"/>
-                <a:cs typeface="Courier New" panose="02070309020205020404" pitchFamily="49" charset="0"/>
-              </a:rPr>
-              <a:t> </a:t>
-            </a:r>
-            <a:r>
-              <a:rPr lang="en-US" sz="1100" dirty="0" err="1">
-                <a:solidFill>
-                  <a:srgbClr val="000000"/>
-                </a:solidFill>
-                <a:latin typeface="Courier New" panose="02070309020205020404" pitchFamily="49" charset="0"/>
-                <a:cs typeface="Courier New" panose="02070309020205020404" pitchFamily="49" charset="0"/>
-              </a:rPr>
-              <a:t>ValidationErrorInfo</a:t>
-            </a:r>
-            <a:r>
-              <a:rPr lang="en-US" sz="1100" dirty="0">
-                <a:solidFill>
-                  <a:srgbClr val="000000"/>
-                </a:solidFill>
-                <a:latin typeface="Courier New" panose="02070309020205020404" pitchFamily="49" charset="0"/>
-                <a:cs typeface="Courier New" panose="02070309020205020404" pitchFamily="49" charset="0"/>
-              </a:rPr>
-              <a:t> { </a:t>
-            </a:r>
-            <a:r>
-              <a:rPr lang="en-US" sz="1100" dirty="0" err="1">
-                <a:solidFill>
-                  <a:srgbClr val="000000"/>
-                </a:solidFill>
-                <a:latin typeface="Courier New" panose="02070309020205020404" pitchFamily="49" charset="0"/>
-                <a:cs typeface="Courier New" panose="02070309020205020404" pitchFamily="49" charset="0"/>
-              </a:rPr>
-              <a:t>ErrorCode</a:t>
-            </a:r>
-            <a:r>
-              <a:rPr lang="en-US" sz="1100" dirty="0">
-                <a:solidFill>
-                  <a:srgbClr val="000000"/>
-                </a:solidFill>
-                <a:latin typeface="Courier New" panose="02070309020205020404" pitchFamily="49" charset="0"/>
-                <a:cs typeface="Courier New" panose="02070309020205020404" pitchFamily="49" charset="0"/>
-              </a:rPr>
-              <a:t> = </a:t>
-            </a:r>
-            <a:r>
-              <a:rPr lang="en-US" sz="1100" dirty="0">
-                <a:solidFill>
-                  <a:srgbClr val="A31515"/>
-                </a:solidFill>
-                <a:latin typeface="Courier New" panose="02070309020205020404" pitchFamily="49" charset="0"/>
-                <a:cs typeface="Courier New" panose="02070309020205020404" pitchFamily="49" charset="0"/>
-              </a:rPr>
-              <a:t>$"ambiguous value for </a:t>
-            </a:r>
-            <a:r>
-              <a:rPr lang="en-US" sz="1100" dirty="0">
-                <a:solidFill>
-                  <a:srgbClr val="000000"/>
-                </a:solidFill>
-                <a:latin typeface="Courier New" panose="02070309020205020404" pitchFamily="49" charset="0"/>
-                <a:cs typeface="Courier New" panose="02070309020205020404" pitchFamily="49" charset="0"/>
-              </a:rPr>
-              <a:t>{</a:t>
-            </a:r>
-            <a:r>
-              <a:rPr lang="en-US" sz="1100" dirty="0" err="1">
-                <a:solidFill>
-                  <a:srgbClr val="000000"/>
-                </a:solidFill>
-                <a:latin typeface="Courier New" panose="02070309020205020404" pitchFamily="49" charset="0"/>
-                <a:cs typeface="Courier New" panose="02070309020205020404" pitchFamily="49" charset="0"/>
-              </a:rPr>
-              <a:t>propertyName</a:t>
-            </a:r>
-            <a:r>
-              <a:rPr lang="en-US" sz="1100" dirty="0">
-                <a:solidFill>
-                  <a:srgbClr val="000000"/>
-                </a:solidFill>
-                <a:latin typeface="Courier New" panose="02070309020205020404" pitchFamily="49" charset="0"/>
-                <a:cs typeface="Courier New" panose="02070309020205020404" pitchFamily="49" charset="0"/>
-              </a:rPr>
-              <a:t>}</a:t>
-            </a:r>
-            <a:r>
-              <a:rPr lang="en-US" sz="1100" dirty="0">
-                <a:solidFill>
-                  <a:srgbClr val="A31515"/>
-                </a:solidFill>
-                <a:latin typeface="Courier New" panose="02070309020205020404" pitchFamily="49" charset="0"/>
-                <a:cs typeface="Courier New" panose="02070309020205020404" pitchFamily="49" charset="0"/>
-              </a:rPr>
-              <a:t>"</a:t>
-            </a:r>
-            <a:endParaRPr lang="en-US" sz="1100" dirty="0">
-              <a:solidFill>
-                <a:srgbClr val="000000"/>
-              </a:solidFill>
-              <a:latin typeface="Courier New" panose="02070309020205020404" pitchFamily="49" charset="0"/>
-              <a:cs typeface="Courier New" panose="02070309020205020404" pitchFamily="49" charset="0"/>
-            </a:endParaRPr>
-          </a:p>
-          <a:p>
-            <a:pPr marL="0" indent="0">
-              <a:buNone/>
-            </a:pPr>
-            <a:r>
-              <a:rPr lang="en-US" sz="1100" dirty="0">
-                <a:solidFill>
-                  <a:srgbClr val="000000"/>
-                </a:solidFill>
-                <a:latin typeface="Courier New" panose="02070309020205020404" pitchFamily="49" charset="0"/>
-                <a:cs typeface="Courier New" panose="02070309020205020404" pitchFamily="49" charset="0"/>
-              </a:rPr>
-              <a:t>         </a:t>
-            </a:r>
-            <a:r>
-              <a:rPr lang="en-US" sz="1100" dirty="0" err="1">
-                <a:solidFill>
-                  <a:srgbClr val="000000"/>
-                </a:solidFill>
-                <a:latin typeface="Courier New" panose="02070309020205020404" pitchFamily="49" charset="0"/>
-                <a:cs typeface="Courier New" panose="02070309020205020404" pitchFamily="49" charset="0"/>
-              </a:rPr>
-              <a:t>AssistantAction</a:t>
-            </a:r>
-            <a:r>
-              <a:rPr lang="en-US" sz="1100" dirty="0">
-                <a:solidFill>
-                  <a:srgbClr val="000000"/>
-                </a:solidFill>
-                <a:latin typeface="Courier New" panose="02070309020205020404" pitchFamily="49" charset="0"/>
-                <a:cs typeface="Courier New" panose="02070309020205020404" pitchFamily="49" charset="0"/>
-              </a:rPr>
-              <a:t> = </a:t>
-            </a:r>
-            <a:r>
-              <a:rPr lang="en-US" sz="1100" dirty="0">
-                <a:solidFill>
-                  <a:srgbClr val="A31515"/>
-                </a:solidFill>
-                <a:latin typeface="Courier New" panose="02070309020205020404" pitchFamily="49" charset="0"/>
-                <a:cs typeface="Courier New" panose="02070309020205020404" pitchFamily="49" charset="0"/>
-              </a:rPr>
-              <a:t>$"reply to the user with these exact words: \"choose among the following values for </a:t>
-            </a:r>
-            <a:r>
-              <a:rPr lang="en-US" sz="1100" dirty="0">
-                <a:solidFill>
-                  <a:srgbClr val="000000"/>
-                </a:solidFill>
-                <a:latin typeface="Courier New" panose="02070309020205020404" pitchFamily="49" charset="0"/>
-                <a:cs typeface="Courier New" panose="02070309020205020404" pitchFamily="49" charset="0"/>
-              </a:rPr>
-              <a:t>{</a:t>
-            </a:r>
-            <a:r>
-              <a:rPr lang="en-US" sz="1100" dirty="0" err="1">
-                <a:solidFill>
-                  <a:srgbClr val="000000"/>
-                </a:solidFill>
-                <a:latin typeface="Courier New" panose="02070309020205020404" pitchFamily="49" charset="0"/>
-                <a:cs typeface="Courier New" panose="02070309020205020404" pitchFamily="49" charset="0"/>
-              </a:rPr>
-              <a:t>propertyName</a:t>
-            </a:r>
-            <a:r>
-              <a:rPr lang="en-US" sz="1100" dirty="0">
-                <a:solidFill>
-                  <a:srgbClr val="000000"/>
-                </a:solidFill>
-                <a:latin typeface="Courier New" panose="02070309020205020404" pitchFamily="49" charset="0"/>
-                <a:cs typeface="Courier New" panose="02070309020205020404" pitchFamily="49" charset="0"/>
-              </a:rPr>
-              <a:t>}</a:t>
-            </a:r>
-            <a:r>
-              <a:rPr lang="en-US" sz="1100" dirty="0">
-                <a:solidFill>
-                  <a:srgbClr val="A31515"/>
-                </a:solidFill>
-                <a:latin typeface="Courier New" panose="02070309020205020404" pitchFamily="49" charset="0"/>
-                <a:cs typeface="Courier New" panose="02070309020205020404" pitchFamily="49" charset="0"/>
-              </a:rPr>
-              <a:t> : </a:t>
-            </a:r>
-            <a:r>
-              <a:rPr lang="en-US" sz="1100" dirty="0">
-                <a:solidFill>
-                  <a:srgbClr val="000000"/>
-                </a:solidFill>
-                <a:latin typeface="Courier New" panose="02070309020205020404" pitchFamily="49" charset="0"/>
-                <a:cs typeface="Courier New" panose="02070309020205020404" pitchFamily="49" charset="0"/>
-              </a:rPr>
-              <a:t>{</a:t>
-            </a:r>
-            <a:r>
-              <a:rPr lang="en-US" sz="1100" dirty="0" err="1">
-                <a:solidFill>
-                  <a:srgbClr val="0000FF"/>
-                </a:solidFill>
-                <a:latin typeface="Courier New" panose="02070309020205020404" pitchFamily="49" charset="0"/>
-                <a:cs typeface="Courier New" panose="02070309020205020404" pitchFamily="49" charset="0"/>
-              </a:rPr>
-              <a:t>string</a:t>
-            </a:r>
-            <a:r>
-              <a:rPr lang="en-US" sz="1100" dirty="0" err="1">
-                <a:solidFill>
-                  <a:srgbClr val="000000"/>
-                </a:solidFill>
-                <a:latin typeface="Courier New" panose="02070309020205020404" pitchFamily="49" charset="0"/>
-                <a:cs typeface="Courier New" panose="02070309020205020404" pitchFamily="49" charset="0"/>
-              </a:rPr>
-              <a:t>.Join</a:t>
-            </a:r>
-            <a:r>
-              <a:rPr lang="en-US" sz="1100" dirty="0">
-                <a:solidFill>
-                  <a:srgbClr val="000000"/>
-                </a:solidFill>
-                <a:latin typeface="Courier New" panose="02070309020205020404" pitchFamily="49" charset="0"/>
-                <a:cs typeface="Courier New" panose="02070309020205020404" pitchFamily="49" charset="0"/>
-              </a:rPr>
-              <a:t>(</a:t>
-            </a:r>
-            <a:r>
-              <a:rPr lang="en-US" sz="1100" dirty="0">
-                <a:solidFill>
-                  <a:srgbClr val="A31515"/>
-                </a:solidFill>
-                <a:latin typeface="Courier New" panose="02070309020205020404" pitchFamily="49" charset="0"/>
-                <a:cs typeface="Courier New" panose="02070309020205020404" pitchFamily="49" charset="0"/>
-              </a:rPr>
-              <a:t>','</a:t>
-            </a:r>
-            <a:r>
-              <a:rPr lang="en-US" sz="1100" dirty="0">
-                <a:solidFill>
-                  <a:srgbClr val="000000"/>
-                </a:solidFill>
-                <a:latin typeface="Courier New" panose="02070309020205020404" pitchFamily="49" charset="0"/>
-                <a:cs typeface="Courier New" panose="02070309020205020404" pitchFamily="49" charset="0"/>
-              </a:rPr>
-              <a:t>,</a:t>
-            </a:r>
-            <a:r>
-              <a:rPr lang="en-US" sz="1100" dirty="0" err="1">
-                <a:solidFill>
-                  <a:srgbClr val="000000"/>
-                </a:solidFill>
-                <a:latin typeface="Courier New" panose="02070309020205020404" pitchFamily="49" charset="0"/>
-                <a:cs typeface="Courier New" panose="02070309020205020404" pitchFamily="49" charset="0"/>
-              </a:rPr>
-              <a:t>candidatePorts.Take</a:t>
-            </a:r>
-            <a:r>
-              <a:rPr lang="en-US" sz="1100" dirty="0">
-                <a:solidFill>
-                  <a:srgbClr val="000000"/>
-                </a:solidFill>
-                <a:latin typeface="Courier New" panose="02070309020205020404" pitchFamily="49" charset="0"/>
-                <a:cs typeface="Courier New" panose="02070309020205020404" pitchFamily="49" charset="0"/>
-              </a:rPr>
-              <a:t>(5).Select(</a:t>
-            </a:r>
-            <a:r>
-              <a:rPr lang="en-US" sz="1100" dirty="0" err="1">
-                <a:solidFill>
-                  <a:srgbClr val="000000"/>
-                </a:solidFill>
-                <a:latin typeface="Courier New" panose="02070309020205020404" pitchFamily="49" charset="0"/>
-                <a:cs typeface="Courier New" panose="02070309020205020404" pitchFamily="49" charset="0"/>
-              </a:rPr>
-              <a:t>FormatPort</a:t>
-            </a:r>
-            <a:r>
-              <a:rPr lang="en-US" sz="1100" dirty="0">
-                <a:solidFill>
-                  <a:srgbClr val="000000"/>
-                </a:solidFill>
-                <a:latin typeface="Courier New" panose="02070309020205020404" pitchFamily="49" charset="0"/>
-                <a:cs typeface="Courier New" panose="02070309020205020404" pitchFamily="49" charset="0"/>
-              </a:rPr>
-              <a:t>))}</a:t>
-            </a:r>
-            <a:r>
-              <a:rPr lang="en-US" sz="1100" dirty="0">
-                <a:solidFill>
-                  <a:srgbClr val="A31515"/>
-                </a:solidFill>
-                <a:latin typeface="Courier New" panose="02070309020205020404" pitchFamily="49" charset="0"/>
-                <a:cs typeface="Courier New" panose="02070309020205020404" pitchFamily="49" charset="0"/>
-              </a:rPr>
-              <a:t>\"" </a:t>
-            </a:r>
-            <a:r>
-              <a:rPr lang="en-US" sz="1100" dirty="0">
-                <a:solidFill>
-                  <a:srgbClr val="000000"/>
-                </a:solidFill>
-                <a:latin typeface="Courier New" panose="02070309020205020404" pitchFamily="49" charset="0"/>
-                <a:cs typeface="Courier New" panose="02070309020205020404" pitchFamily="49" charset="0"/>
-              </a:rPr>
-              <a:t>}.</a:t>
-            </a:r>
-            <a:r>
-              <a:rPr lang="en-US" sz="1100" dirty="0" err="1">
-                <a:solidFill>
-                  <a:srgbClr val="000000"/>
-                </a:solidFill>
-                <a:latin typeface="Courier New" panose="02070309020205020404" pitchFamily="49" charset="0"/>
-                <a:cs typeface="Courier New" panose="02070309020205020404" pitchFamily="49" charset="0"/>
-              </a:rPr>
-              <a:t>ToJson</a:t>
-            </a:r>
-            <a:r>
-              <a:rPr lang="en-US" sz="1100" dirty="0">
-                <a:solidFill>
-                  <a:srgbClr val="000000"/>
-                </a:solidFill>
-                <a:latin typeface="Courier New" panose="02070309020205020404" pitchFamily="49" charset="0"/>
-                <a:cs typeface="Courier New" panose="02070309020205020404" pitchFamily="49" charset="0"/>
-              </a:rPr>
-              <a:t>())));</a:t>
-            </a:r>
-          </a:p>
-          <a:p>
+              <a:t> are exposed in the swagger doc as strings</a:t>
+            </a:r>
+          </a:p>
+          <a:p>
+            <a:pPr lvl="1"/>
+            <a:r>
+              <a:rPr lang="en-US" dirty="0">
+                <a:sym typeface="Wingdings" panose="05000000000000000000" pitchFamily="2" charset="2"/>
+              </a:rPr>
+              <a:t>Make sure </a:t>
+            </a:r>
+            <a:r>
+              <a:rPr lang="en-US" dirty="0" err="1">
+                <a:sym typeface="Wingdings" panose="05000000000000000000" pitchFamily="2" charset="2"/>
+              </a:rPr>
+              <a:t>enums</a:t>
+            </a:r>
+            <a:r>
+              <a:rPr lang="en-US" dirty="0">
+                <a:sym typeface="Wingdings" panose="05000000000000000000" pitchFamily="2" charset="2"/>
+              </a:rPr>
+              <a:t> as strings are accepted as input at run time</a:t>
+            </a:r>
+          </a:p>
+          <a:p>
+            <a:pPr lvl="2"/>
             <a:endParaRPr lang="en-US" dirty="0">
               <a:sym typeface="Wingdings" panose="05000000000000000000" pitchFamily="2" charset="2"/>
             </a:endParaRPr>
           </a:p>
           <a:p>
-            <a:r>
-              <a:rPr lang="en-US" dirty="0">
-                <a:sym typeface="Wingdings" panose="05000000000000000000" pitchFamily="2" charset="2"/>
-              </a:rPr>
-              <a:t>Given this requirements the api you target the call will be likely a proxy to an actual existing api. </a:t>
-            </a:r>
-          </a:p>
-          <a:p>
+            <a:pPr lvl="1"/>
             <a:endParaRPr lang="en-US" dirty="0"/>
           </a:p>
         </p:txBody>
@@ -4718,7 +6749,7 @@
     </p:spTree>
     <p:extLst>
       <p:ext uri="{BB962C8B-B14F-4D97-AF65-F5344CB8AC3E}">
-        <p14:creationId xmlns:p14="http://schemas.microsoft.com/office/powerpoint/2010/main" val="2234336054"/>
+        <p14:creationId xmlns:p14="http://schemas.microsoft.com/office/powerpoint/2010/main" val="803272294"/>
       </p:ext>
     </p:extLst>
   </p:cSld>
@@ -4750,7 +6781,7 @@
           <p:cNvPr id="2" name="Title 1">
             <a:extLst>
               <a:ext uri="{FF2B5EF4-FFF2-40B4-BE49-F238E27FC236}">
-                <a16:creationId xmlns:a16="http://schemas.microsoft.com/office/drawing/2014/main" id="{738CD57D-70E7-1BDF-4AB1-754912A38D39}"/>
+                <a16:creationId xmlns:a16="http://schemas.microsoft.com/office/drawing/2014/main" id="{472CA6C5-D301-54EC-AECC-79D1CFECC62C}"/>
               </a:ext>
             </a:extLst>
           </p:cNvPr>
@@ -4768,7 +6799,7 @@
           <a:p>
             <a:r>
               <a:rPr lang="en-US" dirty="0"/>
-              <a:t>gotchas</a:t>
+              <a:t>Api design for function calling..  continue</a:t>
             </a:r>
           </a:p>
         </p:txBody>
@@ -4778,7 +6809,7 @@
           <p:cNvPr id="3" name="Content Placeholder 2">
             <a:extLst>
               <a:ext uri="{FF2B5EF4-FFF2-40B4-BE49-F238E27FC236}">
-                <a16:creationId xmlns:a16="http://schemas.microsoft.com/office/drawing/2014/main" id="{5D6012E5-8589-D8A0-5999-F8C417FFAA30}"/>
+                <a16:creationId xmlns:a16="http://schemas.microsoft.com/office/drawing/2014/main" id="{50582BAB-C074-1583-004B-0E400A787E29}"/>
               </a:ext>
             </a:extLst>
           </p:cNvPr>
@@ -4791,24 +6822,499 @@
         </p:nvSpPr>
         <p:spPr/>
         <p:txBody>
-          <a:bodyPr/>
-          <a:lstStyle/>
-          <a:p>
-            <a:r>
-              <a:rPr lang="en-US" dirty="0"/>
-              <a:t>The AI sometime make up parameters (e.g. : email)</a:t>
-            </a:r>
-          </a:p>
-          <a:p>
-            <a:r>
-              <a:rPr lang="en-US" dirty="0"/>
-              <a:t>Put up a good system message</a:t>
-            </a:r>
-          </a:p>
-          <a:p>
-            <a:r>
-              <a:rPr lang="en-US" dirty="0"/>
-              <a:t>Do not expect that required setting is always respected for the properties</a:t>
+          <a:bodyPr>
+            <a:normAutofit lnSpcReduction="10000"/>
+          </a:bodyPr>
+          <a:lstStyle/>
+          <a:p>
+            <a:r>
+              <a:rPr lang="en-US" dirty="0">
+                <a:sym typeface="Wingdings" panose="05000000000000000000" pitchFamily="2" charset="2"/>
+              </a:rPr>
+              <a:t>Validate the input with care (fluent validation)</a:t>
+            </a:r>
+          </a:p>
+          <a:p>
+            <a:r>
+              <a:rPr lang="en-US" dirty="0">
+                <a:sym typeface="Wingdings" panose="05000000000000000000" pitchFamily="2" charset="2"/>
+              </a:rPr>
+              <a:t>Return errors in Json format, stating clearly each property having problem and the action to take</a:t>
+            </a:r>
+          </a:p>
+          <a:p>
+            <a:r>
+              <a:rPr lang="en-US" dirty="0">
+                <a:sym typeface="Wingdings" panose="05000000000000000000" pitchFamily="2" charset="2"/>
+              </a:rPr>
+              <a:t>Your validation code must be </a:t>
+            </a:r>
+            <a:r>
+              <a:rPr lang="en-US" dirty="0" err="1">
+                <a:sym typeface="Wingdings" panose="05000000000000000000" pitchFamily="2" charset="2"/>
+              </a:rPr>
+              <a:t>conversational,suggesting</a:t>
+            </a:r>
+            <a:r>
+              <a:rPr lang="en-US" dirty="0">
+                <a:sym typeface="Wingdings" panose="05000000000000000000" pitchFamily="2" charset="2"/>
+              </a:rPr>
+              <a:t> action to the chatbot,  e.g. : </a:t>
+            </a:r>
+          </a:p>
+          <a:p>
+            <a:pPr marL="0" indent="0">
+              <a:buNone/>
+            </a:pPr>
+            <a:r>
+              <a:rPr lang="en-US" sz="1100" dirty="0" err="1">
+                <a:solidFill>
+                  <a:srgbClr val="000000"/>
+                </a:solidFill>
+                <a:latin typeface="Courier New" panose="02070309020205020404" pitchFamily="49" charset="0"/>
+                <a:cs typeface="Courier New" panose="02070309020205020404" pitchFamily="49" charset="0"/>
+              </a:rPr>
+              <a:t>ret.Errors.Add</a:t>
+            </a:r>
+            <a:r>
+              <a:rPr lang="en-US" sz="1100" dirty="0">
+                <a:solidFill>
+                  <a:srgbClr val="000000"/>
+                </a:solidFill>
+                <a:latin typeface="Courier New" panose="02070309020205020404" pitchFamily="49" charset="0"/>
+                <a:cs typeface="Courier New" panose="02070309020205020404" pitchFamily="49" charset="0"/>
+              </a:rPr>
+              <a:t>(</a:t>
+            </a:r>
+            <a:r>
+              <a:rPr lang="en-US" sz="1100" dirty="0">
+                <a:solidFill>
+                  <a:srgbClr val="0000FF"/>
+                </a:solidFill>
+                <a:latin typeface="Courier New" panose="02070309020205020404" pitchFamily="49" charset="0"/>
+                <a:cs typeface="Courier New" panose="02070309020205020404" pitchFamily="49" charset="0"/>
+              </a:rPr>
+              <a:t>new</a:t>
+            </a:r>
+            <a:r>
+              <a:rPr lang="en-US" sz="1100" dirty="0">
+                <a:solidFill>
+                  <a:srgbClr val="000000"/>
+                </a:solidFill>
+                <a:latin typeface="Courier New" panose="02070309020205020404" pitchFamily="49" charset="0"/>
+                <a:cs typeface="Courier New" panose="02070309020205020404" pitchFamily="49" charset="0"/>
+              </a:rPr>
+              <a:t> </a:t>
+            </a:r>
+            <a:r>
+              <a:rPr lang="en-US" sz="1100" dirty="0" err="1">
+                <a:solidFill>
+                  <a:srgbClr val="000000"/>
+                </a:solidFill>
+                <a:latin typeface="Courier New" panose="02070309020205020404" pitchFamily="49" charset="0"/>
+                <a:cs typeface="Courier New" panose="02070309020205020404" pitchFamily="49" charset="0"/>
+              </a:rPr>
+              <a:t>ValidationFailure</a:t>
+            </a:r>
+            <a:r>
+              <a:rPr lang="en-US" sz="1100" dirty="0">
+                <a:solidFill>
+                  <a:srgbClr val="000000"/>
+                </a:solidFill>
+                <a:latin typeface="Courier New" panose="02070309020205020404" pitchFamily="49" charset="0"/>
+                <a:cs typeface="Courier New" panose="02070309020205020404" pitchFamily="49" charset="0"/>
+              </a:rPr>
+              <a:t>(</a:t>
+            </a:r>
+            <a:r>
+              <a:rPr lang="en-US" sz="1100" dirty="0" err="1">
+                <a:solidFill>
+                  <a:srgbClr val="000000"/>
+                </a:solidFill>
+                <a:latin typeface="Courier New" panose="02070309020205020404" pitchFamily="49" charset="0"/>
+                <a:cs typeface="Courier New" panose="02070309020205020404" pitchFamily="49" charset="0"/>
+              </a:rPr>
+              <a:t>propertyName</a:t>
+            </a:r>
+            <a:r>
+              <a:rPr lang="en-US" sz="1100" dirty="0">
+                <a:solidFill>
+                  <a:srgbClr val="000000"/>
+                </a:solidFill>
+                <a:latin typeface="Courier New" panose="02070309020205020404" pitchFamily="49" charset="0"/>
+                <a:cs typeface="Courier New" panose="02070309020205020404" pitchFamily="49" charset="0"/>
+              </a:rPr>
+              <a:t>,</a:t>
+            </a:r>
+          </a:p>
+          <a:p>
+            <a:pPr marL="0" indent="0">
+              <a:buNone/>
+            </a:pPr>
+            <a:r>
+              <a:rPr lang="en-US" sz="1100" dirty="0">
+                <a:solidFill>
+                  <a:srgbClr val="000000"/>
+                </a:solidFill>
+                <a:latin typeface="Courier New" panose="02070309020205020404" pitchFamily="49" charset="0"/>
+                <a:cs typeface="Courier New" panose="02070309020205020404" pitchFamily="49" charset="0"/>
+              </a:rPr>
+              <a:t>     (</a:t>
+            </a:r>
+            <a:r>
+              <a:rPr lang="en-US" sz="1100" dirty="0">
+                <a:solidFill>
+                  <a:srgbClr val="0000FF"/>
+                </a:solidFill>
+                <a:latin typeface="Courier New" panose="02070309020205020404" pitchFamily="49" charset="0"/>
+                <a:cs typeface="Courier New" panose="02070309020205020404" pitchFamily="49" charset="0"/>
+              </a:rPr>
+              <a:t>new</a:t>
+            </a:r>
+            <a:r>
+              <a:rPr lang="en-US" sz="1100" dirty="0">
+                <a:solidFill>
+                  <a:srgbClr val="000000"/>
+                </a:solidFill>
+                <a:latin typeface="Courier New" panose="02070309020205020404" pitchFamily="49" charset="0"/>
+                <a:cs typeface="Courier New" panose="02070309020205020404" pitchFamily="49" charset="0"/>
+              </a:rPr>
+              <a:t> </a:t>
+            </a:r>
+            <a:r>
+              <a:rPr lang="en-US" sz="1100" dirty="0" err="1">
+                <a:solidFill>
+                  <a:srgbClr val="000000"/>
+                </a:solidFill>
+                <a:latin typeface="Courier New" panose="02070309020205020404" pitchFamily="49" charset="0"/>
+                <a:cs typeface="Courier New" panose="02070309020205020404" pitchFamily="49" charset="0"/>
+              </a:rPr>
+              <a:t>ValidationErrorInfo</a:t>
+            </a:r>
+            <a:r>
+              <a:rPr lang="en-US" sz="1100" dirty="0">
+                <a:solidFill>
+                  <a:srgbClr val="000000"/>
+                </a:solidFill>
+                <a:latin typeface="Courier New" panose="02070309020205020404" pitchFamily="49" charset="0"/>
+                <a:cs typeface="Courier New" panose="02070309020205020404" pitchFamily="49" charset="0"/>
+              </a:rPr>
+              <a:t> { </a:t>
+            </a:r>
+            <a:r>
+              <a:rPr lang="en-US" sz="1100" dirty="0" err="1">
+                <a:solidFill>
+                  <a:srgbClr val="000000"/>
+                </a:solidFill>
+                <a:latin typeface="Courier New" panose="02070309020205020404" pitchFamily="49" charset="0"/>
+                <a:cs typeface="Courier New" panose="02070309020205020404" pitchFamily="49" charset="0"/>
+              </a:rPr>
+              <a:t>ErrorCode</a:t>
+            </a:r>
+            <a:r>
+              <a:rPr lang="en-US" sz="1100" dirty="0">
+                <a:solidFill>
+                  <a:srgbClr val="000000"/>
+                </a:solidFill>
+                <a:latin typeface="Courier New" panose="02070309020205020404" pitchFamily="49" charset="0"/>
+                <a:cs typeface="Courier New" panose="02070309020205020404" pitchFamily="49" charset="0"/>
+              </a:rPr>
+              <a:t> = </a:t>
+            </a:r>
+            <a:r>
+              <a:rPr lang="en-US" sz="1100" dirty="0">
+                <a:solidFill>
+                  <a:srgbClr val="A31515"/>
+                </a:solidFill>
+                <a:latin typeface="Courier New" panose="02070309020205020404" pitchFamily="49" charset="0"/>
+                <a:cs typeface="Courier New" panose="02070309020205020404" pitchFamily="49" charset="0"/>
+              </a:rPr>
+              <a:t>$"ambiguous value for </a:t>
+            </a:r>
+            <a:r>
+              <a:rPr lang="en-US" sz="1100" dirty="0">
+                <a:solidFill>
+                  <a:srgbClr val="000000"/>
+                </a:solidFill>
+                <a:latin typeface="Courier New" panose="02070309020205020404" pitchFamily="49" charset="0"/>
+                <a:cs typeface="Courier New" panose="02070309020205020404" pitchFamily="49" charset="0"/>
+              </a:rPr>
+              <a:t>{</a:t>
+            </a:r>
+            <a:r>
+              <a:rPr lang="en-US" sz="1100" dirty="0" err="1">
+                <a:solidFill>
+                  <a:srgbClr val="000000"/>
+                </a:solidFill>
+                <a:latin typeface="Courier New" panose="02070309020205020404" pitchFamily="49" charset="0"/>
+                <a:cs typeface="Courier New" panose="02070309020205020404" pitchFamily="49" charset="0"/>
+              </a:rPr>
+              <a:t>propertyName</a:t>
+            </a:r>
+            <a:r>
+              <a:rPr lang="en-US" sz="1100" dirty="0">
+                <a:solidFill>
+                  <a:srgbClr val="000000"/>
+                </a:solidFill>
+                <a:latin typeface="Courier New" panose="02070309020205020404" pitchFamily="49" charset="0"/>
+                <a:cs typeface="Courier New" panose="02070309020205020404" pitchFamily="49" charset="0"/>
+              </a:rPr>
+              <a:t>}</a:t>
+            </a:r>
+            <a:r>
+              <a:rPr lang="en-US" sz="1100" dirty="0">
+                <a:solidFill>
+                  <a:srgbClr val="A31515"/>
+                </a:solidFill>
+                <a:latin typeface="Courier New" panose="02070309020205020404" pitchFamily="49" charset="0"/>
+                <a:cs typeface="Courier New" panose="02070309020205020404" pitchFamily="49" charset="0"/>
+              </a:rPr>
+              <a:t>"</a:t>
+            </a:r>
+            <a:endParaRPr lang="en-US" sz="1100" dirty="0">
+              <a:solidFill>
+                <a:srgbClr val="000000"/>
+              </a:solidFill>
+              <a:latin typeface="Courier New" panose="02070309020205020404" pitchFamily="49" charset="0"/>
+              <a:cs typeface="Courier New" panose="02070309020205020404" pitchFamily="49" charset="0"/>
+            </a:endParaRPr>
+          </a:p>
+          <a:p>
+            <a:pPr marL="0" indent="0">
+              <a:buNone/>
+            </a:pPr>
+            <a:r>
+              <a:rPr lang="en-US" sz="1100" dirty="0">
+                <a:solidFill>
+                  <a:srgbClr val="000000"/>
+                </a:solidFill>
+                <a:latin typeface="Courier New" panose="02070309020205020404" pitchFamily="49" charset="0"/>
+                <a:cs typeface="Courier New" panose="02070309020205020404" pitchFamily="49" charset="0"/>
+              </a:rPr>
+              <a:t>         </a:t>
+            </a:r>
+            <a:r>
+              <a:rPr lang="en-US" sz="1100" dirty="0" err="1">
+                <a:solidFill>
+                  <a:srgbClr val="000000"/>
+                </a:solidFill>
+                <a:latin typeface="Courier New" panose="02070309020205020404" pitchFamily="49" charset="0"/>
+                <a:cs typeface="Courier New" panose="02070309020205020404" pitchFamily="49" charset="0"/>
+              </a:rPr>
+              <a:t>AssistantAction</a:t>
+            </a:r>
+            <a:r>
+              <a:rPr lang="en-US" sz="1100" dirty="0">
+                <a:solidFill>
+                  <a:srgbClr val="000000"/>
+                </a:solidFill>
+                <a:latin typeface="Courier New" panose="02070309020205020404" pitchFamily="49" charset="0"/>
+                <a:cs typeface="Courier New" panose="02070309020205020404" pitchFamily="49" charset="0"/>
+              </a:rPr>
+              <a:t> = </a:t>
+            </a:r>
+            <a:r>
+              <a:rPr lang="en-US" sz="1100" dirty="0">
+                <a:solidFill>
+                  <a:srgbClr val="A31515"/>
+                </a:solidFill>
+                <a:latin typeface="Courier New" panose="02070309020205020404" pitchFamily="49" charset="0"/>
+                <a:cs typeface="Courier New" panose="02070309020205020404" pitchFamily="49" charset="0"/>
+              </a:rPr>
+              <a:t>$"reply to the user with these exact words: \"choose among the following values for </a:t>
+            </a:r>
+            <a:r>
+              <a:rPr lang="en-US" sz="1100" dirty="0">
+                <a:solidFill>
+                  <a:srgbClr val="000000"/>
+                </a:solidFill>
+                <a:latin typeface="Courier New" panose="02070309020205020404" pitchFamily="49" charset="0"/>
+                <a:cs typeface="Courier New" panose="02070309020205020404" pitchFamily="49" charset="0"/>
+              </a:rPr>
+              <a:t>{</a:t>
+            </a:r>
+            <a:r>
+              <a:rPr lang="en-US" sz="1100" dirty="0" err="1">
+                <a:solidFill>
+                  <a:srgbClr val="000000"/>
+                </a:solidFill>
+                <a:latin typeface="Courier New" panose="02070309020205020404" pitchFamily="49" charset="0"/>
+                <a:cs typeface="Courier New" panose="02070309020205020404" pitchFamily="49" charset="0"/>
+              </a:rPr>
+              <a:t>propertyName</a:t>
+            </a:r>
+            <a:r>
+              <a:rPr lang="en-US" sz="1100" dirty="0">
+                <a:solidFill>
+                  <a:srgbClr val="000000"/>
+                </a:solidFill>
+                <a:latin typeface="Courier New" panose="02070309020205020404" pitchFamily="49" charset="0"/>
+                <a:cs typeface="Courier New" panose="02070309020205020404" pitchFamily="49" charset="0"/>
+              </a:rPr>
+              <a:t>}</a:t>
+            </a:r>
+            <a:r>
+              <a:rPr lang="en-US" sz="1100" dirty="0">
+                <a:solidFill>
+                  <a:srgbClr val="A31515"/>
+                </a:solidFill>
+                <a:latin typeface="Courier New" panose="02070309020205020404" pitchFamily="49" charset="0"/>
+                <a:cs typeface="Courier New" panose="02070309020205020404" pitchFamily="49" charset="0"/>
+              </a:rPr>
+              <a:t> : </a:t>
+            </a:r>
+            <a:r>
+              <a:rPr lang="en-US" sz="1100" dirty="0">
+                <a:solidFill>
+                  <a:srgbClr val="000000"/>
+                </a:solidFill>
+                <a:latin typeface="Courier New" panose="02070309020205020404" pitchFamily="49" charset="0"/>
+                <a:cs typeface="Courier New" panose="02070309020205020404" pitchFamily="49" charset="0"/>
+              </a:rPr>
+              <a:t>{</a:t>
+            </a:r>
+            <a:r>
+              <a:rPr lang="en-US" sz="1100" dirty="0" err="1">
+                <a:solidFill>
+                  <a:srgbClr val="0000FF"/>
+                </a:solidFill>
+                <a:latin typeface="Courier New" panose="02070309020205020404" pitchFamily="49" charset="0"/>
+                <a:cs typeface="Courier New" panose="02070309020205020404" pitchFamily="49" charset="0"/>
+              </a:rPr>
+              <a:t>string</a:t>
+            </a:r>
+            <a:r>
+              <a:rPr lang="en-US" sz="1100" dirty="0" err="1">
+                <a:solidFill>
+                  <a:srgbClr val="000000"/>
+                </a:solidFill>
+                <a:latin typeface="Courier New" panose="02070309020205020404" pitchFamily="49" charset="0"/>
+                <a:cs typeface="Courier New" panose="02070309020205020404" pitchFamily="49" charset="0"/>
+              </a:rPr>
+              <a:t>.Join</a:t>
+            </a:r>
+            <a:r>
+              <a:rPr lang="en-US" sz="1100" dirty="0">
+                <a:solidFill>
+                  <a:srgbClr val="000000"/>
+                </a:solidFill>
+                <a:latin typeface="Courier New" panose="02070309020205020404" pitchFamily="49" charset="0"/>
+                <a:cs typeface="Courier New" panose="02070309020205020404" pitchFamily="49" charset="0"/>
+              </a:rPr>
+              <a:t>(</a:t>
+            </a:r>
+            <a:r>
+              <a:rPr lang="en-US" sz="1100" dirty="0">
+                <a:solidFill>
+                  <a:srgbClr val="A31515"/>
+                </a:solidFill>
+                <a:latin typeface="Courier New" panose="02070309020205020404" pitchFamily="49" charset="0"/>
+                <a:cs typeface="Courier New" panose="02070309020205020404" pitchFamily="49" charset="0"/>
+              </a:rPr>
+              <a:t>','</a:t>
+            </a:r>
+            <a:r>
+              <a:rPr lang="en-US" sz="1100" dirty="0">
+                <a:solidFill>
+                  <a:srgbClr val="000000"/>
+                </a:solidFill>
+                <a:latin typeface="Courier New" panose="02070309020205020404" pitchFamily="49" charset="0"/>
+                <a:cs typeface="Courier New" panose="02070309020205020404" pitchFamily="49" charset="0"/>
+              </a:rPr>
+              <a:t>,</a:t>
+            </a:r>
+            <a:r>
+              <a:rPr lang="en-US" sz="1100" dirty="0" err="1">
+                <a:solidFill>
+                  <a:srgbClr val="000000"/>
+                </a:solidFill>
+                <a:latin typeface="Courier New" panose="02070309020205020404" pitchFamily="49" charset="0"/>
+                <a:cs typeface="Courier New" panose="02070309020205020404" pitchFamily="49" charset="0"/>
+              </a:rPr>
+              <a:t>candidatePorts.Take</a:t>
+            </a:r>
+            <a:r>
+              <a:rPr lang="en-US" sz="1100" dirty="0">
+                <a:solidFill>
+                  <a:srgbClr val="000000"/>
+                </a:solidFill>
+                <a:latin typeface="Courier New" panose="02070309020205020404" pitchFamily="49" charset="0"/>
+                <a:cs typeface="Courier New" panose="02070309020205020404" pitchFamily="49" charset="0"/>
+              </a:rPr>
+              <a:t>(5).Select(</a:t>
+            </a:r>
+            <a:r>
+              <a:rPr lang="en-US" sz="1100" dirty="0" err="1">
+                <a:solidFill>
+                  <a:srgbClr val="000000"/>
+                </a:solidFill>
+                <a:latin typeface="Courier New" panose="02070309020205020404" pitchFamily="49" charset="0"/>
+                <a:cs typeface="Courier New" panose="02070309020205020404" pitchFamily="49" charset="0"/>
+              </a:rPr>
+              <a:t>FormatPort</a:t>
+            </a:r>
+            <a:r>
+              <a:rPr lang="en-US" sz="1100" dirty="0">
+                <a:solidFill>
+                  <a:srgbClr val="000000"/>
+                </a:solidFill>
+                <a:latin typeface="Courier New" panose="02070309020205020404" pitchFamily="49" charset="0"/>
+                <a:cs typeface="Courier New" panose="02070309020205020404" pitchFamily="49" charset="0"/>
+              </a:rPr>
+              <a:t>))}</a:t>
+            </a:r>
+            <a:r>
+              <a:rPr lang="en-US" sz="1100" dirty="0">
+                <a:solidFill>
+                  <a:srgbClr val="A31515"/>
+                </a:solidFill>
+                <a:latin typeface="Courier New" panose="02070309020205020404" pitchFamily="49" charset="0"/>
+                <a:cs typeface="Courier New" panose="02070309020205020404" pitchFamily="49" charset="0"/>
+              </a:rPr>
+              <a:t>\"" </a:t>
+            </a:r>
+            <a:r>
+              <a:rPr lang="en-US" sz="1100" dirty="0">
+                <a:solidFill>
+                  <a:srgbClr val="000000"/>
+                </a:solidFill>
+                <a:latin typeface="Courier New" panose="02070309020205020404" pitchFamily="49" charset="0"/>
+                <a:cs typeface="Courier New" panose="02070309020205020404" pitchFamily="49" charset="0"/>
+              </a:rPr>
+              <a:t>}.</a:t>
+            </a:r>
+            <a:r>
+              <a:rPr lang="en-US" sz="1100" dirty="0" err="1">
+                <a:solidFill>
+                  <a:srgbClr val="000000"/>
+                </a:solidFill>
+                <a:latin typeface="Courier New" panose="02070309020205020404" pitchFamily="49" charset="0"/>
+                <a:cs typeface="Courier New" panose="02070309020205020404" pitchFamily="49" charset="0"/>
+              </a:rPr>
+              <a:t>ToJson</a:t>
+            </a:r>
+            <a:r>
+              <a:rPr lang="en-US" sz="1100" dirty="0">
+                <a:solidFill>
+                  <a:srgbClr val="000000"/>
+                </a:solidFill>
+                <a:latin typeface="Courier New" panose="02070309020205020404" pitchFamily="49" charset="0"/>
+                <a:cs typeface="Courier New" panose="02070309020205020404" pitchFamily="49" charset="0"/>
+              </a:rPr>
+              <a:t>())));</a:t>
+            </a:r>
+          </a:p>
+          <a:p>
+            <a:endParaRPr lang="en-US" dirty="0">
+              <a:sym typeface="Wingdings" panose="05000000000000000000" pitchFamily="2" charset="2"/>
+            </a:endParaRPr>
+          </a:p>
+          <a:p>
+            <a:r>
+              <a:rPr lang="en-US" dirty="0">
+                <a:sym typeface="Wingdings" panose="05000000000000000000" pitchFamily="2" charset="2"/>
+              </a:rPr>
+              <a:t>Given this requirements the api you target the call will be likely a proxy to an actual existing api. </a:t>
             </a:r>
           </a:p>
           <a:p>
@@ -4819,7 +7325,7 @@
     </p:spTree>
     <p:extLst>
       <p:ext uri="{BB962C8B-B14F-4D97-AF65-F5344CB8AC3E}">
-        <p14:creationId xmlns:p14="http://schemas.microsoft.com/office/powerpoint/2010/main" val="3032493198"/>
+        <p14:creationId xmlns:p14="http://schemas.microsoft.com/office/powerpoint/2010/main" val="2234336054"/>
       </p:ext>
     </p:extLst>
   </p:cSld>
@@ -4851,7 +7357,7 @@
           <p:cNvPr id="2" name="Title 1">
             <a:extLst>
               <a:ext uri="{FF2B5EF4-FFF2-40B4-BE49-F238E27FC236}">
-                <a16:creationId xmlns:a16="http://schemas.microsoft.com/office/drawing/2014/main" id="{14C425C7-5AD3-A208-089A-82DD7DC3B7F0}"/>
+                <a16:creationId xmlns:a16="http://schemas.microsoft.com/office/drawing/2014/main" id="{738CD57D-70E7-1BDF-4AB1-754912A38D39}"/>
               </a:ext>
             </a:extLst>
           </p:cNvPr>
@@ -4869,7 +7375,7 @@
           <a:p>
             <a:r>
               <a:rPr lang="en-US" dirty="0"/>
-              <a:t>EXAMPLE</a:t>
+              <a:t>gotchas</a:t>
             </a:r>
           </a:p>
         </p:txBody>
@@ -4879,7 +7385,7 @@
           <p:cNvPr id="3" name="Content Placeholder 2">
             <a:extLst>
               <a:ext uri="{FF2B5EF4-FFF2-40B4-BE49-F238E27FC236}">
-                <a16:creationId xmlns:a16="http://schemas.microsoft.com/office/drawing/2014/main" id="{3E9314EB-C74E-4EDF-32DE-93724FB6B3D8}"/>
+                <a16:creationId xmlns:a16="http://schemas.microsoft.com/office/drawing/2014/main" id="{5D6012E5-8589-D8A0-5999-F8C417FFAA30}"/>
               </a:ext>
             </a:extLst>
           </p:cNvPr>
@@ -4897,12 +7403,22 @@
           <a:p>
             <a:r>
               <a:rPr lang="en-US" dirty="0"/>
-              <a:t>List, Create quotes </a:t>
-            </a:r>
-            <a:r>
-              <a:rPr lang="en-US"/>
-              <a:t>in mymsc</a:t>
-            </a:r>
+              <a:t>The AI sometime make up parameters (e.g. : email)</a:t>
+            </a:r>
+          </a:p>
+          <a:p>
+            <a:r>
+              <a:rPr lang="en-US" dirty="0"/>
+              <a:t>Put up a good system message</a:t>
+            </a:r>
+          </a:p>
+          <a:p>
+            <a:r>
+              <a:rPr lang="en-US" dirty="0"/>
+              <a:t>Do not expect that required setting is always respected for the properties</a:t>
+            </a:r>
+          </a:p>
+          <a:p>
             <a:endParaRPr lang="en-US" dirty="0"/>
           </a:p>
         </p:txBody>
@@ -4910,7 +7426,7 @@
     </p:spTree>
     <p:extLst>
       <p:ext uri="{BB962C8B-B14F-4D97-AF65-F5344CB8AC3E}">
-        <p14:creationId xmlns:p14="http://schemas.microsoft.com/office/powerpoint/2010/main" val="886877064"/>
+        <p14:creationId xmlns:p14="http://schemas.microsoft.com/office/powerpoint/2010/main" val="3032493198"/>
       </p:ext>
     </p:extLst>
   </p:cSld>
@@ -4942,7 +7458,7 @@
           <p:cNvPr id="2" name="Title 1">
             <a:extLst>
               <a:ext uri="{FF2B5EF4-FFF2-40B4-BE49-F238E27FC236}">
-                <a16:creationId xmlns:a16="http://schemas.microsoft.com/office/drawing/2014/main" id="{21C4ECC1-82EF-B64D-D088-64D7586C53F7}"/>
+                <a16:creationId xmlns:a16="http://schemas.microsoft.com/office/drawing/2014/main" id="{14C425C7-5AD3-A208-089A-82DD7DC3B7F0}"/>
               </a:ext>
             </a:extLst>
           </p:cNvPr>
@@ -4958,7 +7474,10 @@
           <a:bodyPr/>
           <a:lstStyle/>
           <a:p>
-            <a:endParaRPr lang="en-US"/>
+            <a:r>
+              <a:rPr lang="en-US" dirty="0"/>
+              <a:t>EXAMPLE</a:t>
+            </a:r>
           </a:p>
         </p:txBody>
       </p:sp>
@@ -4967,7 +7486,7 @@
           <p:cNvPr id="3" name="Content Placeholder 2">
             <a:extLst>
               <a:ext uri="{FF2B5EF4-FFF2-40B4-BE49-F238E27FC236}">
-                <a16:creationId xmlns:a16="http://schemas.microsoft.com/office/drawing/2014/main" id="{07A69565-55FA-6904-454D-1F4EE036EA04}"/>
+                <a16:creationId xmlns:a16="http://schemas.microsoft.com/office/drawing/2014/main" id="{3E9314EB-C74E-4EDF-32DE-93724FB6B3D8}"/>
               </a:ext>
             </a:extLst>
           </p:cNvPr>
@@ -4985,15 +7504,20 @@
           <a:p>
             <a:r>
               <a:rPr lang="en-US" dirty="0"/>
-              <a:t>https://platform.openai.com/docs/guides/function-calling</a:t>
-            </a:r>
+              <a:t>List, Create quotes </a:t>
+            </a:r>
+            <a:r>
+              <a:rPr lang="en-US"/>
+              <a:t>in mymsc</a:t>
+            </a:r>
+            <a:endParaRPr lang="en-US" dirty="0"/>
           </a:p>
         </p:txBody>
       </p:sp>
     </p:spTree>
     <p:extLst>
       <p:ext uri="{BB962C8B-B14F-4D97-AF65-F5344CB8AC3E}">
-        <p14:creationId xmlns:p14="http://schemas.microsoft.com/office/powerpoint/2010/main" val="2568979085"/>
+        <p14:creationId xmlns:p14="http://schemas.microsoft.com/office/powerpoint/2010/main" val="886877064"/>
       </p:ext>
     </p:extLst>
   </p:cSld>

</xml_diff>